<commit_message>
added tree from wiki, and created new tree for dicom dataset w/ anonymization
</commit_message>
<xml_diff>
--- a/Generic/Posters/2021-08/generic_poster_2021-08.pptx
+++ b/Generic/Posters/2021-08/generic_poster_2021-08.pptx
@@ -4606,7 +4606,7 @@
             <a:avLst/>
           </a:prstGeom>
           <a:solidFill>
-            <a:srgbClr val="A167B2"/>
+            <a:schemeClr val="accent5"/>
           </a:solidFill>
           <a:ln w="60325" cap="flat">
             <a:noFill/>
@@ -5664,7 +5664,7 @@
             <a:avLst/>
           </a:prstGeom>
           <a:solidFill>
-            <a:srgbClr val="A167B2"/>
+            <a:schemeClr val="accent5"/>
           </a:solidFill>
           <a:ln w="12700">
             <a:noFill/>
@@ -5873,179 +5873,7 @@
                 <a:effectLst/>
                 <a:latin typeface="Amaranth" panose="02000503050000020004" pitchFamily="2" charset="0"/>
               </a:rPr>
-              <a:t>Methodology</a:t>
-            </a:r>
-          </a:p>
-        </p:txBody>
-      </p:sp>
-      <p:sp>
-        <p:nvSpPr>
-          <p:cNvPr id="64" name="Text Box 6">
-            <a:extLst>
-              <a:ext uri="{FF2B5EF4-FFF2-40B4-BE49-F238E27FC236}">
-                <a16:creationId xmlns:a16="http://schemas.microsoft.com/office/drawing/2014/main" id="{862E7ADB-31DC-4FA6-AC30-3482F9072D83}"/>
-              </a:ext>
-            </a:extLst>
-          </p:cNvPr>
-          <p:cNvSpPr txBox="1">
-            <a:spLocks noChangeArrowheads="1"/>
-          </p:cNvSpPr>
-          <p:nvPr/>
-        </p:nvSpPr>
-        <p:spPr bwMode="auto">
-          <a:xfrm>
-            <a:off x="990600" y="16589672"/>
-            <a:ext cx="20269199" cy="692497"/>
-          </a:xfrm>
-          <a:prstGeom prst="rect">
-            <a:avLst/>
-          </a:prstGeom>
-          <a:noFill/>
-          <a:ln>
-            <a:noFill/>
-          </a:ln>
-          <a:extLst>
-            <a:ext uri="{909E8E84-426E-40DD-AFC4-6F175D3DCCD1}">
-              <a14:hiddenFill xmlns:a14="http://schemas.microsoft.com/office/drawing/2010/main">
-                <a:solidFill>
-                  <a:schemeClr val="accent1"/>
-                </a:solidFill>
-              </a14:hiddenFill>
-            </a:ext>
-            <a:ext uri="{91240B29-F687-4F45-9708-019B960494DF}">
-              <a14:hiddenLine xmlns:a14="http://schemas.microsoft.com/office/drawing/2010/main" w="9525">
-                <a:solidFill>
-                  <a:schemeClr val="tx1"/>
-                </a:solidFill>
-                <a:miter lim="800000"/>
-                <a:headEnd/>
-                <a:tailEnd/>
-              </a14:hiddenLine>
-            </a:ext>
-            <a:ext uri="{AF507438-7753-43E0-B8FC-AC1667EBCBE1}">
-              <a14:hiddenEffects xmlns:a14="http://schemas.microsoft.com/office/drawing/2010/main">
-                <a:effectLst>
-                  <a:outerShdw dist="35921" dir="2700000" algn="ctr" rotWithShape="0">
-                    <a:schemeClr val="bg2"/>
-                  </a:outerShdw>
-                </a:effectLst>
-              </a14:hiddenEffects>
-            </a:ext>
-          </a:extLst>
-        </p:spPr>
-        <p:txBody>
-          <a:bodyPr wrap="square" lIns="137160" tIns="68580" rIns="137160" bIns="68580">
-            <a:spAutoFit/>
-          </a:bodyPr>
-          <a:lstStyle>
-            <a:defPPr>
-              <a:defRPr kern="1200" smtId="4294967295"/>
-            </a:defPPr>
-            <a:lvl1pPr defTabSz="4703763" eaLnBrk="0" hangingPunct="0">
-              <a:defRPr sz="9300">
-                <a:solidFill>
-                  <a:schemeClr val="tx1"/>
-                </a:solidFill>
-                <a:latin typeface="Arial"/>
-              </a:defRPr>
-            </a:lvl1pPr>
-            <a:lvl2pPr marL="742950" indent="-285750" defTabSz="4703763" eaLnBrk="0" hangingPunct="0">
-              <a:defRPr sz="9300">
-                <a:solidFill>
-                  <a:schemeClr val="tx1"/>
-                </a:solidFill>
-                <a:latin typeface="Arial"/>
-              </a:defRPr>
-            </a:lvl2pPr>
-            <a:lvl3pPr marL="1143000" indent="-228600" defTabSz="4703763" eaLnBrk="0" hangingPunct="0">
-              <a:defRPr sz="9300">
-                <a:solidFill>
-                  <a:schemeClr val="tx1"/>
-                </a:solidFill>
-                <a:latin typeface="Arial"/>
-              </a:defRPr>
-            </a:lvl3pPr>
-            <a:lvl4pPr marL="1600200" indent="-228600" defTabSz="4703763" eaLnBrk="0" hangingPunct="0">
-              <a:defRPr sz="9300">
-                <a:solidFill>
-                  <a:schemeClr val="tx1"/>
-                </a:solidFill>
-                <a:latin typeface="Arial"/>
-              </a:defRPr>
-            </a:lvl4pPr>
-            <a:lvl5pPr marL="2057400" indent="-228600" defTabSz="4703763" eaLnBrk="0" hangingPunct="0">
-              <a:defRPr sz="9300">
-                <a:solidFill>
-                  <a:schemeClr val="tx1"/>
-                </a:solidFill>
-                <a:latin typeface="Arial"/>
-              </a:defRPr>
-            </a:lvl5pPr>
-            <a:lvl6pPr marL="2514600" indent="-228600" defTabSz="4703763" eaLnBrk="0" fontAlgn="base" hangingPunct="0">
-              <a:spcBef>
-                <a:spcPct val="0"/>
-              </a:spcBef>
-              <a:spcAft>
-                <a:spcPct val="0"/>
-              </a:spcAft>
-              <a:defRPr sz="9300">
-                <a:solidFill>
-                  <a:schemeClr val="tx1"/>
-                </a:solidFill>
-                <a:latin typeface="Arial"/>
-              </a:defRPr>
-            </a:lvl6pPr>
-            <a:lvl7pPr marL="2971800" indent="-228600" defTabSz="4703763" eaLnBrk="0" fontAlgn="base" hangingPunct="0">
-              <a:spcBef>
-                <a:spcPct val="0"/>
-              </a:spcBef>
-              <a:spcAft>
-                <a:spcPct val="0"/>
-              </a:spcAft>
-              <a:defRPr sz="9300">
-                <a:solidFill>
-                  <a:schemeClr val="tx1"/>
-                </a:solidFill>
-                <a:latin typeface="Arial"/>
-              </a:defRPr>
-            </a:lvl7pPr>
-            <a:lvl8pPr marL="3429000" indent="-228600" defTabSz="4703763" eaLnBrk="0" fontAlgn="base" hangingPunct="0">
-              <a:spcBef>
-                <a:spcPct val="0"/>
-              </a:spcBef>
-              <a:spcAft>
-                <a:spcPct val="0"/>
-              </a:spcAft>
-              <a:defRPr sz="9300">
-                <a:solidFill>
-                  <a:schemeClr val="tx1"/>
-                </a:solidFill>
-                <a:latin typeface="Arial"/>
-              </a:defRPr>
-            </a:lvl8pPr>
-            <a:lvl9pPr marL="3886200" indent="-228600" defTabSz="4703763" eaLnBrk="0" fontAlgn="base" hangingPunct="0">
-              <a:spcBef>
-                <a:spcPct val="0"/>
-              </a:spcBef>
-              <a:spcAft>
-                <a:spcPct val="0"/>
-              </a:spcAft>
-              <a:defRPr sz="9300">
-                <a:solidFill>
-                  <a:schemeClr val="tx1"/>
-                </a:solidFill>
-                <a:latin typeface="Arial"/>
-              </a:defRPr>
-            </a:lvl9pPr>
-          </a:lstStyle>
-          <a:p>
-            <a:r>
-              <a:rPr lang="en-US" sz="3600" dirty="0">
-                <a:latin typeface="Titillium Web" panose="00000500000000000000" pitchFamily="2" charset="0"/>
-                <a:ea typeface="Open Sans" panose="020B0606030504020204" pitchFamily="34" charset="0"/>
-                <a:cs typeface="Open Sans" panose="020B0606030504020204" pitchFamily="34" charset="0"/>
-              </a:rPr>
-              <a:t>Add your information, graphs and images to this section.</a:t>
+              <a:t>Current Work</a:t>
             </a:r>
           </a:p>
         </p:txBody>
@@ -6073,7 +5901,7 @@
             <a:avLst/>
           </a:prstGeom>
           <a:solidFill>
-            <a:srgbClr val="A167B2"/>
+            <a:schemeClr val="accent5"/>
           </a:solidFill>
           <a:ln w="12700">
             <a:noFill/>
@@ -6724,7 +6552,7 @@
             <a:avLst/>
           </a:prstGeom>
           <a:solidFill>
-            <a:srgbClr val="A167B2"/>
+            <a:schemeClr val="accent5"/>
           </a:solidFill>
           <a:ln w="12700">
             <a:noFill/>
@@ -6954,8 +6782,8 @@
         </p:nvSpPr>
         <p:spPr bwMode="auto">
           <a:xfrm>
-            <a:off x="990600" y="2306405"/>
-            <a:ext cx="20269199" cy="692497"/>
+            <a:off x="1025566" y="2306405"/>
+            <a:ext cx="20269199" cy="3462486"/>
           </a:xfrm>
           <a:prstGeom prst="rect">
             <a:avLst/>
@@ -7105,22 +6933,211 @@
                 <a:ea typeface="Open Sans" panose="020B0606030504020204" pitchFamily="34" charset="0"/>
                 <a:cs typeface="Open Sans" panose="020B0606030504020204" pitchFamily="34" charset="0"/>
               </a:rPr>
-              <a:t>Add your information, graphs and images to this section.</a:t>
+              <a:t>The OpenNeuro PET is working on:</a:t>
+            </a:r>
+          </a:p>
+          <a:p>
+            <a:pPr marL="571500" indent="-571500">
+              <a:buFontTx/>
+              <a:buChar char="-"/>
+            </a:pPr>
+            <a:r>
+              <a:rPr lang="en-US" sz="3600" dirty="0">
+                <a:latin typeface="Titillium Web" panose="00000500000000000000" pitchFamily="2" charset="0"/>
+                <a:ea typeface="Open Sans" panose="020B0606030504020204" pitchFamily="34" charset="0"/>
+                <a:cs typeface="Open Sans" panose="020B0606030504020204" pitchFamily="34" charset="0"/>
+              </a:rPr>
+              <a:t>Further Integrating PET into BIDS -&gt; Brain imaging data structure</a:t>
+            </a:r>
+          </a:p>
+          <a:p>
+            <a:pPr marL="571500" indent="-571500">
+              <a:buFontTx/>
+              <a:buChar char="-"/>
+            </a:pPr>
+            <a:r>
+              <a:rPr lang="en-US" sz="3600" dirty="0">
+                <a:latin typeface="Titillium Web" panose="00000500000000000000" pitchFamily="2" charset="0"/>
+                <a:ea typeface="Open Sans" panose="020B0606030504020204" pitchFamily="34" charset="0"/>
+                <a:cs typeface="Open Sans" panose="020B0606030504020204" pitchFamily="34" charset="0"/>
+              </a:rPr>
+              <a:t>Providing Tools and Support to convert imaging and physio data into BIDS</a:t>
+            </a:r>
+          </a:p>
+          <a:p>
+            <a:pPr marL="571500" indent="-571500">
+              <a:buFontTx/>
+              <a:buChar char="-"/>
+            </a:pPr>
+            <a:r>
+              <a:rPr lang="en-US" sz="3600" dirty="0">
+                <a:latin typeface="Titillium Web" panose="00000500000000000000" pitchFamily="2" charset="0"/>
+                <a:ea typeface="Open Sans" panose="020B0606030504020204" pitchFamily="34" charset="0"/>
+                <a:cs typeface="Open Sans" panose="020B0606030504020204" pitchFamily="34" charset="0"/>
+              </a:rPr>
+              <a:t>Partnering w/ Existing Neuroimaging libraries/efforts </a:t>
+            </a:r>
+          </a:p>
+          <a:p>
+            <a:endParaRPr lang="en-US" sz="3600" dirty="0">
+              <a:latin typeface="Titillium Web" panose="00000500000000000000" pitchFamily="2" charset="0"/>
+              <a:ea typeface="Open Sans" panose="020B0606030504020204" pitchFamily="34" charset="0"/>
+              <a:cs typeface="Open Sans" panose="020B0606030504020204" pitchFamily="34" charset="0"/>
+            </a:endParaRPr>
+          </a:p>
+          <a:p>
+            <a:endParaRPr lang="en-US" sz="3600" dirty="0">
+              <a:latin typeface="Titillium Web" panose="00000500000000000000" pitchFamily="2" charset="0"/>
+              <a:ea typeface="Open Sans" panose="020B0606030504020204" pitchFamily="34" charset="0"/>
+              <a:cs typeface="Open Sans" panose="020B0606030504020204" pitchFamily="34" charset="0"/>
+            </a:endParaRPr>
+          </a:p>
+        </p:txBody>
+      </p:sp>
+      <p:sp>
+        <p:nvSpPr>
+          <p:cNvPr id="33" name="Title 11">
+            <a:extLst>
+              <a:ext uri="{FF2B5EF4-FFF2-40B4-BE49-F238E27FC236}">
+                <a16:creationId xmlns:a16="http://schemas.microsoft.com/office/drawing/2014/main" id="{B9B45461-D198-453D-923C-6C7A6C10DAEA}"/>
+              </a:ext>
+            </a:extLst>
+          </p:cNvPr>
+          <p:cNvSpPr txBox="1">
+            <a:spLocks/>
+          </p:cNvSpPr>
+          <p:nvPr/>
+        </p:nvSpPr>
+        <p:spPr>
+          <a:xfrm>
+            <a:off x="23041117" y="1367609"/>
+            <a:ext cx="17954484" cy="8370485"/>
+          </a:xfrm>
+          <a:prstGeom prst="rect">
+            <a:avLst/>
+          </a:prstGeom>
+        </p:spPr>
+        <p:txBody>
+          <a:bodyPr lIns="128016" tIns="64008" rIns="128016" bIns="64008"/>
+          <a:lstStyle>
+            <a:defPPr>
+              <a:defRPr lang="en-US"/>
+            </a:defPPr>
+            <a:lvl1pPr marL="0" algn="l" defTabSz="4388077" rtl="0" eaLnBrk="1" latinLnBrk="0" hangingPunct="1">
+              <a:defRPr sz="8698" kern="1200">
+                <a:solidFill>
+                  <a:schemeClr val="tx1"/>
+                </a:solidFill>
+                <a:latin typeface="+mn-lt"/>
+                <a:ea typeface="+mn-ea"/>
+                <a:cs typeface="+mn-cs"/>
+              </a:defRPr>
+            </a:lvl1pPr>
+            <a:lvl2pPr marL="2194039" algn="l" defTabSz="4388077" rtl="0" eaLnBrk="1" latinLnBrk="0" hangingPunct="1">
+              <a:defRPr sz="8698" kern="1200">
+                <a:solidFill>
+                  <a:schemeClr val="tx1"/>
+                </a:solidFill>
+                <a:latin typeface="+mn-lt"/>
+                <a:ea typeface="+mn-ea"/>
+                <a:cs typeface="+mn-cs"/>
+              </a:defRPr>
+            </a:lvl2pPr>
+            <a:lvl3pPr marL="4388077" algn="l" defTabSz="4388077" rtl="0" eaLnBrk="1" latinLnBrk="0" hangingPunct="1">
+              <a:defRPr sz="8698" kern="1200">
+                <a:solidFill>
+                  <a:schemeClr val="tx1"/>
+                </a:solidFill>
+                <a:latin typeface="+mn-lt"/>
+                <a:ea typeface="+mn-ea"/>
+                <a:cs typeface="+mn-cs"/>
+              </a:defRPr>
+            </a:lvl3pPr>
+            <a:lvl4pPr marL="6582120" algn="l" defTabSz="4388077" rtl="0" eaLnBrk="1" latinLnBrk="0" hangingPunct="1">
+              <a:defRPr sz="8698" kern="1200">
+                <a:solidFill>
+                  <a:schemeClr val="tx1"/>
+                </a:solidFill>
+                <a:latin typeface="+mn-lt"/>
+                <a:ea typeface="+mn-ea"/>
+                <a:cs typeface="+mn-cs"/>
+              </a:defRPr>
+            </a:lvl4pPr>
+            <a:lvl5pPr marL="8776160" algn="l" defTabSz="4388077" rtl="0" eaLnBrk="1" latinLnBrk="0" hangingPunct="1">
+              <a:defRPr sz="8698" kern="1200">
+                <a:solidFill>
+                  <a:schemeClr val="tx1"/>
+                </a:solidFill>
+                <a:latin typeface="+mn-lt"/>
+                <a:ea typeface="+mn-ea"/>
+                <a:cs typeface="+mn-cs"/>
+              </a:defRPr>
+            </a:lvl5pPr>
+            <a:lvl6pPr marL="10970199" algn="l" defTabSz="4388077" rtl="0" eaLnBrk="1" latinLnBrk="0" hangingPunct="1">
+              <a:defRPr sz="8698" kern="1200">
+                <a:solidFill>
+                  <a:schemeClr val="tx1"/>
+                </a:solidFill>
+                <a:latin typeface="+mn-lt"/>
+                <a:ea typeface="+mn-ea"/>
+                <a:cs typeface="+mn-cs"/>
+              </a:defRPr>
+            </a:lvl6pPr>
+            <a:lvl7pPr marL="13164238" algn="l" defTabSz="4388077" rtl="0" eaLnBrk="1" latinLnBrk="0" hangingPunct="1">
+              <a:defRPr sz="8698" kern="1200">
+                <a:solidFill>
+                  <a:schemeClr val="tx1"/>
+                </a:solidFill>
+                <a:latin typeface="+mn-lt"/>
+                <a:ea typeface="+mn-ea"/>
+                <a:cs typeface="+mn-cs"/>
+              </a:defRPr>
+            </a:lvl7pPr>
+            <a:lvl8pPr marL="15358277" algn="l" defTabSz="4388077" rtl="0" eaLnBrk="1" latinLnBrk="0" hangingPunct="1">
+              <a:defRPr sz="8698" kern="1200">
+                <a:solidFill>
+                  <a:schemeClr val="tx1"/>
+                </a:solidFill>
+                <a:latin typeface="+mn-lt"/>
+                <a:ea typeface="+mn-ea"/>
+                <a:cs typeface="+mn-cs"/>
+              </a:defRPr>
+            </a:lvl8pPr>
+            <a:lvl9pPr marL="17552317" algn="l" defTabSz="4388077" rtl="0" eaLnBrk="1" latinLnBrk="0" hangingPunct="1">
+              <a:defRPr sz="8698" kern="1200">
+                <a:solidFill>
+                  <a:schemeClr val="tx1"/>
+                </a:solidFill>
+                <a:latin typeface="+mn-lt"/>
+                <a:ea typeface="+mn-ea"/>
+                <a:cs typeface="+mn-cs"/>
+              </a:defRPr>
+            </a:lvl9pPr>
+          </a:lstStyle>
+          <a:p>
+            <a:r>
+              <a:rPr lang="en-US" sz="11000" dirty="0">
+                <a:solidFill>
+                  <a:schemeClr val="bg1"/>
+                </a:solidFill>
+                <a:latin typeface="Titillium Web" panose="00000500000000000000" pitchFamily="2" charset="0"/>
+              </a:rPr>
+              <a:t>OpenNeuro PET is developing infrastructure and tooling that increases accessibility, reproducibility, and the curation of PET data.</a:t>
             </a:r>
           </a:p>
         </p:txBody>
       </p:sp>
       <p:pic>
         <p:nvPicPr>
-          <p:cNvPr id="29" name="Picture 2">
+          <p:cNvPr id="3" name="Graphic 2">
             <a:extLst>
               <a:ext uri="{FF2B5EF4-FFF2-40B4-BE49-F238E27FC236}">
-                <a16:creationId xmlns:a16="http://schemas.microsoft.com/office/drawing/2014/main" id="{A082F9A7-18ED-43EA-9DA0-389F5DC80F49}"/>
+                <a16:creationId xmlns:a16="http://schemas.microsoft.com/office/drawing/2014/main" id="{5A47324D-1BEB-714B-A237-3E53F32E3BA5}"/>
               </a:ext>
             </a:extLst>
           </p:cNvPr>
           <p:cNvPicPr>
-            <a:picLocks noChangeAspect="1" noChangeArrowheads="1"/>
+            <a:picLocks noChangeAspect="1"/>
           </p:cNvPicPr>
           <p:nvPr/>
         </p:nvPicPr>
@@ -7130,357 +7147,25 @@
               <a:ext uri="{28A0092B-C50C-407E-A947-70E740481C1C}">
                 <a14:useLocalDpi xmlns:a14="http://schemas.microsoft.com/office/drawing/2010/main" val="0"/>
               </a:ext>
+              <a:ext uri="{96DAC541-7B7A-43D3-8B79-37D633B846F1}">
+                <asvg:svgBlip xmlns:asvg="http://schemas.microsoft.com/office/drawing/2016/SVG/main" r:embed="rId4"/>
+              </a:ext>
             </a:extLst>
           </a:blip>
-          <a:srcRect/>
           <a:stretch>
             <a:fillRect/>
           </a:stretch>
         </p:blipFill>
-        <p:spPr bwMode="auto">
-          <a:xfrm>
-            <a:off x="39944942" y="11059929"/>
-            <a:ext cx="2803257" cy="2803257"/>
-          </a:xfrm>
-          <a:prstGeom prst="rect">
-            <a:avLst/>
-          </a:prstGeom>
-          <a:noFill/>
-          <a:extLst>
-            <a:ext uri="{909E8E84-426E-40DD-AFC4-6F175D3DCCD1}">
-              <a14:hiddenFill xmlns:a14="http://schemas.microsoft.com/office/drawing/2010/main">
-                <a:solidFill>
-                  <a:srgbClr val="FFFFFF"/>
-                </a:solidFill>
-              </a14:hiddenFill>
-            </a:ext>
-          </a:extLst>
-        </p:spPr>
-      </p:pic>
-      <p:sp>
-        <p:nvSpPr>
-          <p:cNvPr id="33" name="Title 11">
-            <a:extLst>
-              <a:ext uri="{FF2B5EF4-FFF2-40B4-BE49-F238E27FC236}">
-                <a16:creationId xmlns:a16="http://schemas.microsoft.com/office/drawing/2014/main" id="{B9B45461-D198-453D-923C-6C7A6C10DAEA}"/>
-              </a:ext>
-            </a:extLst>
-          </p:cNvPr>
-          <p:cNvSpPr txBox="1">
-            <a:spLocks/>
-          </p:cNvSpPr>
-          <p:nvPr/>
-        </p:nvSpPr>
         <p:spPr>
           <a:xfrm>
-            <a:off x="23041116" y="1367609"/>
-            <a:ext cx="19707083" cy="8370485"/>
+            <a:off x="38876372" y="10301370"/>
+            <a:ext cx="3452729" cy="3452729"/>
           </a:xfrm>
           <a:prstGeom prst="rect">
             <a:avLst/>
           </a:prstGeom>
         </p:spPr>
-        <p:txBody>
-          <a:bodyPr lIns="128016" tIns="64008" rIns="128016" bIns="64008"/>
-          <a:lstStyle>
-            <a:defPPr>
-              <a:defRPr lang="en-US"/>
-            </a:defPPr>
-            <a:lvl1pPr marL="0" algn="l" defTabSz="4388077" rtl="0" eaLnBrk="1" latinLnBrk="0" hangingPunct="1">
-              <a:defRPr sz="8698" kern="1200">
-                <a:solidFill>
-                  <a:schemeClr val="tx1"/>
-                </a:solidFill>
-                <a:latin typeface="+mn-lt"/>
-                <a:ea typeface="+mn-ea"/>
-                <a:cs typeface="+mn-cs"/>
-              </a:defRPr>
-            </a:lvl1pPr>
-            <a:lvl2pPr marL="2194039" algn="l" defTabSz="4388077" rtl="0" eaLnBrk="1" latinLnBrk="0" hangingPunct="1">
-              <a:defRPr sz="8698" kern="1200">
-                <a:solidFill>
-                  <a:schemeClr val="tx1"/>
-                </a:solidFill>
-                <a:latin typeface="+mn-lt"/>
-                <a:ea typeface="+mn-ea"/>
-                <a:cs typeface="+mn-cs"/>
-              </a:defRPr>
-            </a:lvl2pPr>
-            <a:lvl3pPr marL="4388077" algn="l" defTabSz="4388077" rtl="0" eaLnBrk="1" latinLnBrk="0" hangingPunct="1">
-              <a:defRPr sz="8698" kern="1200">
-                <a:solidFill>
-                  <a:schemeClr val="tx1"/>
-                </a:solidFill>
-                <a:latin typeface="+mn-lt"/>
-                <a:ea typeface="+mn-ea"/>
-                <a:cs typeface="+mn-cs"/>
-              </a:defRPr>
-            </a:lvl3pPr>
-            <a:lvl4pPr marL="6582120" algn="l" defTabSz="4388077" rtl="0" eaLnBrk="1" latinLnBrk="0" hangingPunct="1">
-              <a:defRPr sz="8698" kern="1200">
-                <a:solidFill>
-                  <a:schemeClr val="tx1"/>
-                </a:solidFill>
-                <a:latin typeface="+mn-lt"/>
-                <a:ea typeface="+mn-ea"/>
-                <a:cs typeface="+mn-cs"/>
-              </a:defRPr>
-            </a:lvl4pPr>
-            <a:lvl5pPr marL="8776160" algn="l" defTabSz="4388077" rtl="0" eaLnBrk="1" latinLnBrk="0" hangingPunct="1">
-              <a:defRPr sz="8698" kern="1200">
-                <a:solidFill>
-                  <a:schemeClr val="tx1"/>
-                </a:solidFill>
-                <a:latin typeface="+mn-lt"/>
-                <a:ea typeface="+mn-ea"/>
-                <a:cs typeface="+mn-cs"/>
-              </a:defRPr>
-            </a:lvl5pPr>
-            <a:lvl6pPr marL="10970199" algn="l" defTabSz="4388077" rtl="0" eaLnBrk="1" latinLnBrk="0" hangingPunct="1">
-              <a:defRPr sz="8698" kern="1200">
-                <a:solidFill>
-                  <a:schemeClr val="tx1"/>
-                </a:solidFill>
-                <a:latin typeface="+mn-lt"/>
-                <a:ea typeface="+mn-ea"/>
-                <a:cs typeface="+mn-cs"/>
-              </a:defRPr>
-            </a:lvl6pPr>
-            <a:lvl7pPr marL="13164238" algn="l" defTabSz="4388077" rtl="0" eaLnBrk="1" latinLnBrk="0" hangingPunct="1">
-              <a:defRPr sz="8698" kern="1200">
-                <a:solidFill>
-                  <a:schemeClr val="tx1"/>
-                </a:solidFill>
-                <a:latin typeface="+mn-lt"/>
-                <a:ea typeface="+mn-ea"/>
-                <a:cs typeface="+mn-cs"/>
-              </a:defRPr>
-            </a:lvl7pPr>
-            <a:lvl8pPr marL="15358277" algn="l" defTabSz="4388077" rtl="0" eaLnBrk="1" latinLnBrk="0" hangingPunct="1">
-              <a:defRPr sz="8698" kern="1200">
-                <a:solidFill>
-                  <a:schemeClr val="tx1"/>
-                </a:solidFill>
-                <a:latin typeface="+mn-lt"/>
-                <a:ea typeface="+mn-ea"/>
-                <a:cs typeface="+mn-cs"/>
-              </a:defRPr>
-            </a:lvl8pPr>
-            <a:lvl9pPr marL="17552317" algn="l" defTabSz="4388077" rtl="0" eaLnBrk="1" latinLnBrk="0" hangingPunct="1">
-              <a:defRPr sz="8698" kern="1200">
-                <a:solidFill>
-                  <a:schemeClr val="tx1"/>
-                </a:solidFill>
-                <a:latin typeface="+mn-lt"/>
-                <a:ea typeface="+mn-ea"/>
-                <a:cs typeface="+mn-cs"/>
-              </a:defRPr>
-            </a:lvl9pPr>
-          </a:lstStyle>
-          <a:p>
-            <a:r>
-              <a:rPr lang="en-US" sz="11000" dirty="0">
-                <a:solidFill>
-                  <a:schemeClr val="bg1"/>
-                </a:solidFill>
-                <a:latin typeface="Titillium Web" panose="00000500000000000000" pitchFamily="2" charset="0"/>
-              </a:rPr>
-              <a:t>OpenNeuro PET is developing infrastructure and tooling to increase accessibility, reproducibility, and ease of curation of PET data.</a:t>
-            </a:r>
-          </a:p>
-        </p:txBody>
-      </p:sp>
-      <p:sp>
-        <p:nvSpPr>
-          <p:cNvPr id="22" name="Text Placeholder 5">
-            <a:extLst>
-              <a:ext uri="{FF2B5EF4-FFF2-40B4-BE49-F238E27FC236}">
-                <a16:creationId xmlns:a16="http://schemas.microsoft.com/office/drawing/2014/main" id="{B4C6D0F6-AC3E-4096-855B-F29BB829E6D5}"/>
-              </a:ext>
-            </a:extLst>
-          </p:cNvPr>
-          <p:cNvSpPr txBox="1"/>
-          <p:nvPr/>
-        </p:nvSpPr>
-        <p:spPr>
-          <a:xfrm>
-            <a:off x="33392301" y="12154386"/>
-            <a:ext cx="6095440" cy="1661993"/>
-          </a:xfrm>
-          <a:prstGeom prst="rect">
-            <a:avLst/>
-          </a:prstGeom>
-        </p:spPr>
-        <p:txBody>
-          <a:bodyPr wrap="square" lIns="0" tIns="0" rIns="0" bIns="0">
-            <a:spAutoFit/>
-          </a:bodyPr>
-          <a:lstStyle>
-            <a:defPPr>
-              <a:defRPr kern="1200" smtId="4294967295"/>
-            </a:defPPr>
-            <a:lvl1pPr marL="0" marR="0" indent="0" algn="l" defTabSz="3761086" rtl="0" eaLnBrk="1" fontAlgn="auto" latinLnBrk="0" hangingPunct="1">
-              <a:lnSpc>
-                <a:spcPct val="100000"/>
-              </a:lnSpc>
-              <a:spcBef>
-                <a:spcPct val="20000"/>
-              </a:spcBef>
-              <a:spcAft>
-                <a:spcPct val="0"/>
-              </a:spcAft>
-              <a:buClrTx/>
-              <a:buSzTx/>
-              <a:buFont typeface="Arial" pitchFamily="34" charset="0"/>
-              <a:buNone/>
-              <a:defRPr sz="6000" kern="1200" baseline="0">
-                <a:solidFill>
-                  <a:schemeClr val="tx2"/>
-                </a:solidFill>
-                <a:latin typeface="Franklin Gothic Heavy" pitchFamily="34" charset="0"/>
-                <a:ea typeface="+mn-ea"/>
-                <a:cs typeface="+mn-cs"/>
-              </a:defRPr>
-            </a:lvl1pPr>
-            <a:lvl2pPr marL="1880543" indent="0" algn="l" defTabSz="3761086" rtl="0" eaLnBrk="1" latinLnBrk="0" hangingPunct="1">
-              <a:spcBef>
-                <a:spcPct val="20000"/>
-              </a:spcBef>
-              <a:buFontTx/>
-              <a:buNone/>
-              <a:defRPr sz="11500" kern="1200">
-                <a:solidFill>
-                  <a:schemeClr val="tx1"/>
-                </a:solidFill>
-                <a:latin typeface="+mn-lt"/>
-                <a:ea typeface="+mn-ea"/>
-                <a:cs typeface="+mn-cs"/>
-              </a:defRPr>
-            </a:lvl2pPr>
-            <a:lvl3pPr marL="3761086" indent="0" algn="l" defTabSz="3761086" rtl="0" eaLnBrk="1" latinLnBrk="0" hangingPunct="1">
-              <a:spcBef>
-                <a:spcPct val="20000"/>
-              </a:spcBef>
-              <a:buFontTx/>
-              <a:buNone/>
-              <a:defRPr sz="9900" kern="1200">
-                <a:solidFill>
-                  <a:schemeClr val="tx1"/>
-                </a:solidFill>
-                <a:latin typeface="+mn-lt"/>
-                <a:ea typeface="+mn-ea"/>
-                <a:cs typeface="+mn-cs"/>
-              </a:defRPr>
-            </a:lvl3pPr>
-            <a:lvl4pPr marL="5641629" indent="0" algn="l" defTabSz="3761086" rtl="0" eaLnBrk="1" latinLnBrk="0" hangingPunct="1">
-              <a:spcBef>
-                <a:spcPct val="20000"/>
-              </a:spcBef>
-              <a:buFontTx/>
-              <a:buNone/>
-              <a:defRPr sz="8200" kern="1200">
-                <a:solidFill>
-                  <a:schemeClr val="tx1"/>
-                </a:solidFill>
-                <a:latin typeface="+mn-lt"/>
-                <a:ea typeface="+mn-ea"/>
-                <a:cs typeface="+mn-cs"/>
-              </a:defRPr>
-            </a:lvl4pPr>
-            <a:lvl5pPr marL="7522172" indent="0" algn="l" defTabSz="3761086" rtl="0" eaLnBrk="1" latinLnBrk="0" hangingPunct="1">
-              <a:spcBef>
-                <a:spcPct val="20000"/>
-              </a:spcBef>
-              <a:buFontTx/>
-              <a:buNone/>
-              <a:defRPr sz="8200" kern="1200">
-                <a:solidFill>
-                  <a:schemeClr val="tx1"/>
-                </a:solidFill>
-                <a:latin typeface="+mn-lt"/>
-                <a:ea typeface="+mn-ea"/>
-                <a:cs typeface="+mn-cs"/>
-              </a:defRPr>
-            </a:lvl5pPr>
-            <a:lvl6pPr marL="10342988" indent="-940272" algn="l" defTabSz="3761086" rtl="0" eaLnBrk="1" latinLnBrk="0" hangingPunct="1">
-              <a:spcBef>
-                <a:spcPct val="20000"/>
-              </a:spcBef>
-              <a:buFont typeface="Arial" pitchFamily="34" charset="0"/>
-              <a:buChar char="•"/>
-              <a:defRPr sz="8200" kern="1200">
-                <a:solidFill>
-                  <a:schemeClr val="tx1"/>
-                </a:solidFill>
-                <a:latin typeface="+mn-lt"/>
-                <a:ea typeface="+mn-ea"/>
-                <a:cs typeface="+mn-cs"/>
-              </a:defRPr>
-            </a:lvl6pPr>
-            <a:lvl7pPr marL="12223531" indent="-940272" algn="l" defTabSz="3761086" rtl="0" eaLnBrk="1" latinLnBrk="0" hangingPunct="1">
-              <a:spcBef>
-                <a:spcPct val="20000"/>
-              </a:spcBef>
-              <a:buFont typeface="Arial" pitchFamily="34" charset="0"/>
-              <a:buChar char="•"/>
-              <a:defRPr sz="8200" kern="1200">
-                <a:solidFill>
-                  <a:schemeClr val="tx1"/>
-                </a:solidFill>
-                <a:latin typeface="+mn-lt"/>
-                <a:ea typeface="+mn-ea"/>
-                <a:cs typeface="+mn-cs"/>
-              </a:defRPr>
-            </a:lvl7pPr>
-            <a:lvl8pPr marL="14104074" indent="-940272" algn="l" defTabSz="3761086" rtl="0" eaLnBrk="1" latinLnBrk="0" hangingPunct="1">
-              <a:spcBef>
-                <a:spcPct val="20000"/>
-              </a:spcBef>
-              <a:buFont typeface="Arial" pitchFamily="34" charset="0"/>
-              <a:buChar char="•"/>
-              <a:defRPr sz="8200" kern="1200">
-                <a:solidFill>
-                  <a:schemeClr val="tx1"/>
-                </a:solidFill>
-                <a:latin typeface="+mn-lt"/>
-                <a:ea typeface="+mn-ea"/>
-                <a:cs typeface="+mn-cs"/>
-              </a:defRPr>
-            </a:lvl8pPr>
-            <a:lvl9pPr marL="15984617" indent="-940272" algn="l" defTabSz="3761086" rtl="0" eaLnBrk="1" latinLnBrk="0" hangingPunct="1">
-              <a:spcBef>
-                <a:spcPct val="20000"/>
-              </a:spcBef>
-              <a:buFont typeface="Arial" pitchFamily="34" charset="0"/>
-              <a:buChar char="•"/>
-              <a:defRPr sz="8200" kern="1200">
-                <a:solidFill>
-                  <a:schemeClr val="tx1"/>
-                </a:solidFill>
-                <a:latin typeface="+mn-lt"/>
-                <a:ea typeface="+mn-ea"/>
-                <a:cs typeface="+mn-cs"/>
-              </a:defRPr>
-            </a:lvl9pPr>
-          </a:lstStyle>
-          <a:p>
-            <a:pPr>
-              <a:defRPr/>
-            </a:pPr>
-            <a:r>
-              <a:rPr lang="en-US" sz="3600" dirty="0">
-                <a:solidFill>
-                  <a:schemeClr val="bg1"/>
-                </a:solidFill>
-                <a:effectLst/>
-                <a:latin typeface="Titillium Web" panose="00000500000000000000" pitchFamily="2" charset="0"/>
-                <a:cs typeface="Arial" panose="020B0604020202020204" pitchFamily="34" charset="0"/>
-              </a:rPr>
-              <a:t>Include a QR code to scan to download a digital copy of your poster.</a:t>
-            </a:r>
-          </a:p>
-        </p:txBody>
-      </p:sp>
+      </p:pic>
     </p:spTree>
   </p:cSld>
   <p:clrMapOvr>

</xml_diff>

<commit_message>
filled out first panel, filling out next
</commit_message>
<xml_diff>
--- a/Generic/Posters/2021-08/generic_poster_2021-08.pptx
+++ b/Generic/Posters/2021-08/generic_poster_2021-08.pptx
@@ -4891,7 +4891,7 @@
                 </a:solidFill>
                 <a:latin typeface="Amaranth" panose="02000503050000020004" pitchFamily="2" charset="0"/>
               </a:rPr>
-              <a:t>OpenNeuro PET</a:t>
+              <a:t>OpenNeuroPET</a:t>
             </a:r>
           </a:p>
         </p:txBody>
@@ -5171,8 +5171,8 @@
         </p:nvSpPr>
         <p:spPr>
           <a:xfrm>
-            <a:off x="762000" y="15087600"/>
-            <a:ext cx="20796332" cy="13548827"/>
+            <a:off x="761999" y="16764000"/>
+            <a:ext cx="20796332" cy="11872427"/>
           </a:xfrm>
           <a:prstGeom prst="rect">
             <a:avLst/>
@@ -5657,7 +5657,7 @@
         </p:nvSpPr>
         <p:spPr bwMode="auto">
           <a:xfrm>
-            <a:off x="762000" y="15087600"/>
+            <a:off x="761999" y="17973864"/>
             <a:ext cx="20796332" cy="1126553"/>
           </a:xfrm>
           <a:prstGeom prst="rect">
@@ -6302,7 +6302,7 @@
         <p:spPr>
           <a:xfrm>
             <a:off x="762000" y="804334"/>
-            <a:ext cx="20796332" cy="13548827"/>
+            <a:ext cx="20796332" cy="15350066"/>
           </a:xfrm>
           <a:prstGeom prst="rect">
             <a:avLst/>
@@ -6783,7 +6783,7 @@
         <p:spPr bwMode="auto">
           <a:xfrm>
             <a:off x="1025566" y="2306405"/>
-            <a:ext cx="20269199" cy="3462486"/>
+            <a:ext cx="20269199" cy="1800493"/>
           </a:xfrm>
           <a:prstGeom prst="rect">
             <a:avLst/>
@@ -6933,57 +6933,8 @@
                 <a:ea typeface="Open Sans" panose="020B0606030504020204" pitchFamily="34" charset="0"/>
                 <a:cs typeface="Open Sans" panose="020B0606030504020204" pitchFamily="34" charset="0"/>
               </a:rPr>
-              <a:t>The OpenNeuro PET is working on:</a:t>
-            </a:r>
-          </a:p>
-          <a:p>
-            <a:pPr marL="571500" indent="-571500">
-              <a:buFontTx/>
-              <a:buChar char="-"/>
-            </a:pPr>
-            <a:r>
-              <a:rPr lang="en-US" sz="3600" dirty="0">
-                <a:latin typeface="Titillium Web" panose="00000500000000000000" pitchFamily="2" charset="0"/>
-                <a:ea typeface="Open Sans" panose="020B0606030504020204" pitchFamily="34" charset="0"/>
-                <a:cs typeface="Open Sans" panose="020B0606030504020204" pitchFamily="34" charset="0"/>
-              </a:rPr>
-              <a:t>Further Integrating PET into BIDS -&gt; Brain imaging data structure</a:t>
-            </a:r>
-          </a:p>
-          <a:p>
-            <a:pPr marL="571500" indent="-571500">
-              <a:buFontTx/>
-              <a:buChar char="-"/>
-            </a:pPr>
-            <a:r>
-              <a:rPr lang="en-US" sz="3600" dirty="0">
-                <a:latin typeface="Titillium Web" panose="00000500000000000000" pitchFamily="2" charset="0"/>
-                <a:ea typeface="Open Sans" panose="020B0606030504020204" pitchFamily="34" charset="0"/>
-                <a:cs typeface="Open Sans" panose="020B0606030504020204" pitchFamily="34" charset="0"/>
-              </a:rPr>
-              <a:t>Providing Tools and Support to convert imaging and physio data into BIDS</a:t>
-            </a:r>
-          </a:p>
-          <a:p>
-            <a:pPr marL="571500" indent="-571500">
-              <a:buFontTx/>
-              <a:buChar char="-"/>
-            </a:pPr>
-            <a:r>
-              <a:rPr lang="en-US" sz="3600" dirty="0">
-                <a:latin typeface="Titillium Web" panose="00000500000000000000" pitchFamily="2" charset="0"/>
-                <a:ea typeface="Open Sans" panose="020B0606030504020204" pitchFamily="34" charset="0"/>
-                <a:cs typeface="Open Sans" panose="020B0606030504020204" pitchFamily="34" charset="0"/>
-              </a:rPr>
-              <a:t>Partnering w/ Existing Neuroimaging libraries/efforts </a:t>
-            </a:r>
-          </a:p>
-          <a:p>
-            <a:endParaRPr lang="en-US" sz="3600" dirty="0">
-              <a:latin typeface="Titillium Web" panose="00000500000000000000" pitchFamily="2" charset="0"/>
-              <a:ea typeface="Open Sans" panose="020B0606030504020204" pitchFamily="34" charset="0"/>
-              <a:cs typeface="Open Sans" panose="020B0606030504020204" pitchFamily="34" charset="0"/>
-            </a:endParaRPr>
+              <a:t>OpenNeuroPET is focused on creating the infrastructure to guide research data into BIDS, but what does that look like?</a:t>
+            </a:r>
           </a:p>
           <a:p>
             <a:endParaRPr lang="en-US" sz="3600" dirty="0">
@@ -7122,7 +7073,7 @@
                 </a:solidFill>
                 <a:latin typeface="Titillium Web" panose="00000500000000000000" pitchFamily="2" charset="0"/>
               </a:rPr>
-              <a:t>OpenNeuro PET is developing infrastructure and tooling that increases accessibility, reproducibility, and the curation of PET data.</a:t>
+              <a:t>OpenNeuroPET is developing infrastructure and tooling that increases accessibility, reproducibility, and the curation of PET data.</a:t>
             </a:r>
           </a:p>
         </p:txBody>
@@ -7168,10 +7119,10 @@
       </p:pic>
       <p:pic>
         <p:nvPicPr>
-          <p:cNvPr id="6" name="Picture 5" descr="Text&#10;&#10;Description automatically generated">
+          <p:cNvPr id="58" name="Picture 57" descr="Text&#10;&#10;Description automatically generated">
             <a:extLst>
               <a:ext uri="{FF2B5EF4-FFF2-40B4-BE49-F238E27FC236}">
-                <a16:creationId xmlns:a16="http://schemas.microsoft.com/office/drawing/2014/main" id="{528F99AC-2FB6-C840-AAFC-41A08C4E43D7}"/>
+                <a16:creationId xmlns:a16="http://schemas.microsoft.com/office/drawing/2014/main" id="{36746ECF-9FDD-9247-82EE-C8A4C1473BD5}"/>
               </a:ext>
             </a:extLst>
           </p:cNvPr>
@@ -7194,8 +7145,8 @@
         </p:blipFill>
         <p:spPr>
           <a:xfrm>
-            <a:off x="1455420" y="7477433"/>
-            <a:ext cx="4145999" cy="4521321"/>
+            <a:off x="5443105" y="3152835"/>
+            <a:ext cx="3488451" cy="3804248"/>
           </a:xfrm>
           <a:prstGeom prst="rect">
             <a:avLst/>
@@ -7204,10 +7155,10 @@
       </p:pic>
       <p:pic>
         <p:nvPicPr>
-          <p:cNvPr id="8" name="Picture 7" descr="A picture containing text&#10;&#10;Description automatically generated">
+          <p:cNvPr id="59" name="Picture 58" descr="A picture containing text&#10;&#10;Description automatically generated">
             <a:extLst>
               <a:ext uri="{FF2B5EF4-FFF2-40B4-BE49-F238E27FC236}">
-                <a16:creationId xmlns:a16="http://schemas.microsoft.com/office/drawing/2014/main" id="{36D61842-1EF0-F243-B7F3-E16315B5B8CE}"/>
+                <a16:creationId xmlns:a16="http://schemas.microsoft.com/office/drawing/2014/main" id="{7BF70697-6F15-DF4C-83CD-C21515D34257}"/>
               </a:ext>
             </a:extLst>
           </p:cNvPr>
@@ -7230,14 +7181,366 @@
         </p:blipFill>
         <p:spPr>
           <a:xfrm>
-            <a:off x="6019800" y="7477433"/>
-            <a:ext cx="3668068" cy="6578601"/>
+            <a:off x="9533866" y="3152835"/>
+            <a:ext cx="3277190" cy="5877570"/>
           </a:xfrm>
           <a:prstGeom prst="rect">
             <a:avLst/>
           </a:prstGeom>
         </p:spPr>
       </p:pic>
+      <p:pic>
+        <p:nvPicPr>
+          <p:cNvPr id="62" name="Picture 61" descr="Text&#10;&#10;Description automatically generated">
+            <a:extLst>
+              <a:ext uri="{FF2B5EF4-FFF2-40B4-BE49-F238E27FC236}">
+                <a16:creationId xmlns:a16="http://schemas.microsoft.com/office/drawing/2014/main" id="{8053EBB5-CA8B-7D48-BCF2-163F9C981E43}"/>
+              </a:ext>
+            </a:extLst>
+          </p:cNvPr>
+          <p:cNvPicPr>
+            <a:picLocks noChangeAspect="1"/>
+          </p:cNvPicPr>
+          <p:nvPr/>
+        </p:nvPicPr>
+        <p:blipFill>
+          <a:blip r:embed="rId7">
+            <a:extLst>
+              <a:ext uri="{28A0092B-C50C-407E-A947-70E740481C1C}">
+                <a14:useLocalDpi xmlns:a14="http://schemas.microsoft.com/office/drawing/2010/main" val="0"/>
+              </a:ext>
+            </a:extLst>
+          </a:blip>
+          <a:stretch>
+            <a:fillRect/>
+          </a:stretch>
+        </p:blipFill>
+        <p:spPr>
+          <a:xfrm>
+            <a:off x="13413367" y="3152835"/>
+            <a:ext cx="7748586" cy="6415342"/>
+          </a:xfrm>
+          <a:prstGeom prst="rect">
+            <a:avLst/>
+          </a:prstGeom>
+        </p:spPr>
+      </p:pic>
+      <p:cxnSp>
+        <p:nvCxnSpPr>
+          <p:cNvPr id="63" name="Elbow Connector 62">
+            <a:extLst>
+              <a:ext uri="{FF2B5EF4-FFF2-40B4-BE49-F238E27FC236}">
+                <a16:creationId xmlns:a16="http://schemas.microsoft.com/office/drawing/2014/main" id="{B44047AE-E4E8-C74A-B5CB-92512BBA2873}"/>
+              </a:ext>
+            </a:extLst>
+          </p:cNvPr>
+          <p:cNvCxnSpPr>
+            <a:cxnSpLocks/>
+            <a:stCxn id="59" idx="2"/>
+            <a:endCxn id="62" idx="2"/>
+          </p:cNvCxnSpPr>
+          <p:nvPr/>
+        </p:nvCxnSpPr>
+        <p:spPr bwMode="auto">
+          <a:xfrm rot="16200000" flipH="1">
+            <a:off x="13961174" y="6241691"/>
+            <a:ext cx="537772" cy="6115199"/>
+          </a:xfrm>
+          <a:prstGeom prst="bentConnector3">
+            <a:avLst>
+              <a:gd name="adj1" fmla="val 142509"/>
+            </a:avLst>
+          </a:prstGeom>
+          <a:solidFill>
+            <a:schemeClr val="accent1"/>
+          </a:solidFill>
+          <a:ln w="57150" cap="flat" cmpd="sng" algn="ctr">
+            <a:solidFill>
+              <a:schemeClr val="accent4"/>
+            </a:solidFill>
+            <a:prstDash val="solid"/>
+            <a:round/>
+            <a:headEnd type="none" w="med" len="med"/>
+            <a:tailEnd type="stealth" w="med" len="med"/>
+          </a:ln>
+          <a:effectLst/>
+          <a:extLst>
+            <a:ext uri="{AF507438-7753-43E0-B8FC-AC1667EBCBE1}">
+              <a14:hiddenEffects xmlns:a14="http://schemas.microsoft.com/office/drawing/2010/main">
+                <a:effectLst>
+                  <a:outerShdw dist="35921" dir="2700000" algn="ctr" rotWithShape="0">
+                    <a:schemeClr val="bg2"/>
+                  </a:outerShdw>
+                </a:effectLst>
+              </a14:hiddenEffects>
+            </a:ext>
+          </a:extLst>
+        </p:spPr>
+      </p:cxnSp>
+      <p:sp>
+        <p:nvSpPr>
+          <p:cNvPr id="65" name="TextBox 64">
+            <a:extLst>
+              <a:ext uri="{FF2B5EF4-FFF2-40B4-BE49-F238E27FC236}">
+                <a16:creationId xmlns:a16="http://schemas.microsoft.com/office/drawing/2014/main" id="{91AE78A3-74E6-C744-AD0C-718C719E177E}"/>
+              </a:ext>
+            </a:extLst>
+          </p:cNvPr>
+          <p:cNvSpPr txBox="1"/>
+          <p:nvPr/>
+        </p:nvSpPr>
+        <p:spPr>
+          <a:xfrm>
+            <a:off x="1180631" y="3581400"/>
+            <a:ext cx="3773995" cy="6370975"/>
+          </a:xfrm>
+          <a:prstGeom prst="rect">
+            <a:avLst/>
+          </a:prstGeom>
+          <a:noFill/>
+        </p:spPr>
+        <p:txBody>
+          <a:bodyPr wrap="square" rtlCol="0">
+            <a:spAutoFit/>
+          </a:bodyPr>
+          <a:lstStyle/>
+          <a:p>
+            <a:r>
+              <a:rPr lang="en-US" sz="2400" dirty="0"/>
+              <a:t>One of the first steps to increasing the shareability of PET data was the inclusion of PET into the popular brain imaging data structure BIDS [1]  with BEP009 [2]. A standardized data format makes sharing different datasets simpler as part of the data dictionary is included in the file structure itself. Modalities follow a standard scheme and additional metadata is included in json or tab separated text files.  </a:t>
+            </a:r>
+          </a:p>
+        </p:txBody>
+      </p:sp>
+      <p:cxnSp>
+        <p:nvCxnSpPr>
+          <p:cNvPr id="66" name="Elbow Connector 65">
+            <a:extLst>
+              <a:ext uri="{FF2B5EF4-FFF2-40B4-BE49-F238E27FC236}">
+                <a16:creationId xmlns:a16="http://schemas.microsoft.com/office/drawing/2014/main" id="{04CB0F5A-48D3-B64B-BCC1-2EB9C4954EC5}"/>
+              </a:ext>
+            </a:extLst>
+          </p:cNvPr>
+          <p:cNvCxnSpPr>
+            <a:cxnSpLocks/>
+            <a:endCxn id="62" idx="2"/>
+          </p:cNvCxnSpPr>
+          <p:nvPr/>
+        </p:nvCxnSpPr>
+        <p:spPr bwMode="auto">
+          <a:xfrm>
+            <a:off x="7187331" y="6919138"/>
+            <a:ext cx="10100329" cy="2649039"/>
+          </a:xfrm>
+          <a:prstGeom prst="bentConnector4">
+            <a:avLst>
+              <a:gd name="adj1" fmla="val 15"/>
+              <a:gd name="adj2" fmla="val 108630"/>
+            </a:avLst>
+          </a:prstGeom>
+          <a:solidFill>
+            <a:schemeClr val="accent1"/>
+          </a:solidFill>
+          <a:ln w="57150" cap="flat" cmpd="sng" algn="ctr">
+            <a:solidFill>
+              <a:schemeClr val="accent4"/>
+            </a:solidFill>
+            <a:prstDash val="solid"/>
+            <a:round/>
+            <a:headEnd type="none" w="med" len="med"/>
+            <a:tailEnd type="stealth" w="med" len="med"/>
+          </a:ln>
+          <a:effectLst/>
+          <a:extLst>
+            <a:ext uri="{AF507438-7753-43E0-B8FC-AC1667EBCBE1}">
+              <a14:hiddenEffects xmlns:a14="http://schemas.microsoft.com/office/drawing/2010/main">
+                <a:effectLst>
+                  <a:outerShdw dist="35921" dir="2700000" algn="ctr" rotWithShape="0">
+                    <a:schemeClr val="bg2"/>
+                  </a:outerShdw>
+                </a:effectLst>
+              </a14:hiddenEffects>
+            </a:ext>
+          </a:extLst>
+        </p:spPr>
+      </p:cxnSp>
+      <p:sp>
+        <p:nvSpPr>
+          <p:cNvPr id="71" name="TextBox 70">
+            <a:extLst>
+              <a:ext uri="{FF2B5EF4-FFF2-40B4-BE49-F238E27FC236}">
+                <a16:creationId xmlns:a16="http://schemas.microsoft.com/office/drawing/2014/main" id="{9E436EB7-CEBF-4842-A673-57198F813912}"/>
+              </a:ext>
+            </a:extLst>
+          </p:cNvPr>
+          <p:cNvSpPr txBox="1"/>
+          <p:nvPr/>
+        </p:nvSpPr>
+        <p:spPr>
+          <a:xfrm>
+            <a:off x="5408181" y="7046655"/>
+            <a:ext cx="1673522" cy="2554545"/>
+          </a:xfrm>
+          <a:prstGeom prst="rect">
+            <a:avLst/>
+          </a:prstGeom>
+          <a:noFill/>
+        </p:spPr>
+        <p:txBody>
+          <a:bodyPr wrap="square" rtlCol="0">
+            <a:spAutoFit/>
+          </a:bodyPr>
+          <a:lstStyle/>
+          <a:p>
+            <a:r>
+              <a:rPr lang="en-US" sz="1600" dirty="0"/>
+              <a:t>Organizing these datasets into the standardized BIDS set on the right leads to easier classification for humans and machines alike.</a:t>
+            </a:r>
+          </a:p>
+        </p:txBody>
+      </p:sp>
+      <p:sp>
+        <p:nvSpPr>
+          <p:cNvPr id="72" name="TextBox 71">
+            <a:extLst>
+              <a:ext uri="{FF2B5EF4-FFF2-40B4-BE49-F238E27FC236}">
+                <a16:creationId xmlns:a16="http://schemas.microsoft.com/office/drawing/2014/main" id="{C4690C7B-4C97-6047-96A2-2B78DF514462}"/>
+              </a:ext>
+            </a:extLst>
+          </p:cNvPr>
+          <p:cNvSpPr txBox="1"/>
+          <p:nvPr/>
+        </p:nvSpPr>
+        <p:spPr>
+          <a:xfrm>
+            <a:off x="7576652" y="7046655"/>
+            <a:ext cx="1910324" cy="1815882"/>
+          </a:xfrm>
+          <a:prstGeom prst="rect">
+            <a:avLst/>
+          </a:prstGeom>
+          <a:noFill/>
+        </p:spPr>
+        <p:txBody>
+          <a:bodyPr wrap="square" rtlCol="0">
+            <a:spAutoFit/>
+          </a:bodyPr>
+          <a:lstStyle/>
+          <a:p>
+            <a:r>
+              <a:rPr lang="en-US" sz="1600" dirty="0"/>
+              <a:t>Applying BIDS to PET data reduces the imaging file count in the and standardizes both imaging and physiological data.</a:t>
+            </a:r>
+          </a:p>
+        </p:txBody>
+      </p:sp>
+      <p:pic>
+        <p:nvPicPr>
+          <p:cNvPr id="74" name="Picture 73" descr="Graphical user interface&#10;&#10;Description automatically generated">
+            <a:extLst>
+              <a:ext uri="{FF2B5EF4-FFF2-40B4-BE49-F238E27FC236}">
+                <a16:creationId xmlns:a16="http://schemas.microsoft.com/office/drawing/2014/main" id="{50BC3315-C118-B145-B8E5-AF11601BABCC}"/>
+              </a:ext>
+            </a:extLst>
+          </p:cNvPr>
+          <p:cNvPicPr>
+            <a:picLocks noChangeAspect="1"/>
+          </p:cNvPicPr>
+          <p:nvPr/>
+        </p:nvPicPr>
+        <p:blipFill>
+          <a:blip r:embed="rId8">
+            <a:extLst>
+              <a:ext uri="{28A0092B-C50C-407E-A947-70E740481C1C}">
+                <a14:useLocalDpi xmlns:a14="http://schemas.microsoft.com/office/drawing/2010/main" val="0"/>
+              </a:ext>
+            </a:extLst>
+          </a:blip>
+          <a:stretch>
+            <a:fillRect/>
+          </a:stretch>
+        </p:blipFill>
+        <p:spPr>
+          <a:xfrm>
+            <a:off x="5594268" y="10458199"/>
+            <a:ext cx="7588250" cy="4667832"/>
+          </a:xfrm>
+          <a:prstGeom prst="rect">
+            <a:avLst/>
+          </a:prstGeom>
+        </p:spPr>
+      </p:pic>
+      <p:pic>
+        <p:nvPicPr>
+          <p:cNvPr id="76" name="Picture 75" descr="Graphical user interface, application&#10;&#10;Description automatically generated">
+            <a:extLst>
+              <a:ext uri="{FF2B5EF4-FFF2-40B4-BE49-F238E27FC236}">
+                <a16:creationId xmlns:a16="http://schemas.microsoft.com/office/drawing/2014/main" id="{BF90C837-216A-444F-A0D1-98387487D27E}"/>
+              </a:ext>
+            </a:extLst>
+          </p:cNvPr>
+          <p:cNvPicPr>
+            <a:picLocks noChangeAspect="1"/>
+          </p:cNvPicPr>
+          <p:nvPr/>
+        </p:nvPicPr>
+        <p:blipFill>
+          <a:blip r:embed="rId9">
+            <a:extLst>
+              <a:ext uri="{28A0092B-C50C-407E-A947-70E740481C1C}">
+                <a14:useLocalDpi xmlns:a14="http://schemas.microsoft.com/office/drawing/2010/main" val="0"/>
+              </a:ext>
+            </a:extLst>
+          </a:blip>
+          <a:stretch>
+            <a:fillRect/>
+          </a:stretch>
+        </p:blipFill>
+        <p:spPr>
+          <a:xfrm>
+            <a:off x="13589000" y="10458199"/>
+            <a:ext cx="7588250" cy="4667832"/>
+          </a:xfrm>
+          <a:prstGeom prst="rect">
+            <a:avLst/>
+          </a:prstGeom>
+        </p:spPr>
+      </p:pic>
+      <p:sp>
+        <p:nvSpPr>
+          <p:cNvPr id="77" name="TextBox 76">
+            <a:extLst>
+              <a:ext uri="{FF2B5EF4-FFF2-40B4-BE49-F238E27FC236}">
+                <a16:creationId xmlns:a16="http://schemas.microsoft.com/office/drawing/2014/main" id="{7B423532-0E0D-1E4E-AAD3-26A3DDC61644}"/>
+              </a:ext>
+            </a:extLst>
+          </p:cNvPr>
+          <p:cNvSpPr txBox="1"/>
+          <p:nvPr/>
+        </p:nvSpPr>
+        <p:spPr>
+          <a:xfrm>
+            <a:off x="1180631" y="10301370"/>
+            <a:ext cx="3384937" cy="4893647"/>
+          </a:xfrm>
+          <a:prstGeom prst="rect">
+            <a:avLst/>
+          </a:prstGeom>
+          <a:noFill/>
+        </p:spPr>
+        <p:txBody>
+          <a:bodyPr wrap="square" rtlCol="0">
+            <a:spAutoFit/>
+          </a:bodyPr>
+          <a:lstStyle/>
+          <a:p>
+            <a:r>
+              <a:rPr lang="en-US" sz="2400" dirty="0"/>
+              <a:t>Once a PET dataset is converted into BIDS it can be uploaded, browsed, and downloaded via a browser (or the command line). The BIDS Validator will tell you if the dataset is valid and you can collect, view, or run analysis on this standardized structure.</a:t>
+            </a:r>
+          </a:p>
+        </p:txBody>
+      </p:sp>
     </p:spTree>
   </p:cSld>
   <p:clrMapOvr>

</xml_diff>

<commit_message>
rearranged a bit, need to fill out current work and make it look nice....
</commit_message>
<xml_diff>
--- a/Generic/Posters/2021-08/generic_poster_2021-08.pptx
+++ b/Generic/Posters/2021-08/generic_poster_2021-08.pptx
@@ -5159,248 +5159,6 @@
       </p:sp>
       <p:sp>
         <p:nvSpPr>
-          <p:cNvPr id="40" name="Rectangle 39">
-            <a:extLst>
-              <a:ext uri="{FF2B5EF4-FFF2-40B4-BE49-F238E27FC236}">
-                <a16:creationId xmlns:a16="http://schemas.microsoft.com/office/drawing/2014/main" id="{25FA4F44-89FB-4B70-8C08-283DA58E1D01}"/>
-              </a:ext>
-            </a:extLst>
-          </p:cNvPr>
-          <p:cNvSpPr/>
-          <p:nvPr/>
-        </p:nvSpPr>
-        <p:spPr>
-          <a:xfrm>
-            <a:off x="761999" y="16764000"/>
-            <a:ext cx="20796332" cy="11872427"/>
-          </a:xfrm>
-          <a:prstGeom prst="rect">
-            <a:avLst/>
-          </a:prstGeom>
-          <a:solidFill>
-            <a:schemeClr val="bg1"/>
-          </a:solidFill>
-          <a:ln>
-            <a:noFill/>
-          </a:ln>
-        </p:spPr>
-        <p:style>
-          <a:lnRef idx="2">
-            <a:schemeClr val="accent1">
-              <a:shade val="50000"/>
-            </a:schemeClr>
-          </a:lnRef>
-          <a:fillRef idx="1">
-            <a:schemeClr val="accent1"/>
-          </a:fillRef>
-          <a:effectRef idx="0">
-            <a:schemeClr val="accent1"/>
-          </a:effectRef>
-          <a:fontRef idx="minor">
-            <a:schemeClr val="lt1"/>
-          </a:fontRef>
-        </p:style>
-        <p:txBody>
-          <a:bodyPr rtlCol="0" anchor="ctr"/>
-          <a:lstStyle>
-            <a:defPPr>
-              <a:defRPr lang="en-US"/>
-            </a:defPPr>
-            <a:lvl1pPr algn="l" rtl="0" eaLnBrk="0" fontAlgn="base" hangingPunct="0">
-              <a:spcBef>
-                <a:spcPct val="0"/>
-              </a:spcBef>
-              <a:spcAft>
-                <a:spcPct val="0"/>
-              </a:spcAft>
-              <a:defRPr sz="2400" kern="1200">
-                <a:solidFill>
-                  <a:schemeClr val="lt1"/>
-                </a:solidFill>
-                <a:effectLst>
-                  <a:outerShdw blurRad="38100" dist="38100" dir="2700000" algn="tl">
-                    <a:srgbClr val="000000">
-                      <a:alpha val="43137"/>
-                    </a:srgbClr>
-                  </a:outerShdw>
-                </a:effectLst>
-                <a:latin typeface="+mn-lt"/>
-                <a:ea typeface="+mn-ea"/>
-                <a:cs typeface="+mn-cs"/>
-              </a:defRPr>
-            </a:lvl1pPr>
-            <a:lvl2pPr marL="457200" algn="l" rtl="0" eaLnBrk="0" fontAlgn="base" hangingPunct="0">
-              <a:spcBef>
-                <a:spcPct val="0"/>
-              </a:spcBef>
-              <a:spcAft>
-                <a:spcPct val="0"/>
-              </a:spcAft>
-              <a:defRPr sz="2400" kern="1200">
-                <a:solidFill>
-                  <a:schemeClr val="lt1"/>
-                </a:solidFill>
-                <a:effectLst>
-                  <a:outerShdw blurRad="38100" dist="38100" dir="2700000" algn="tl">
-                    <a:srgbClr val="000000">
-                      <a:alpha val="43137"/>
-                    </a:srgbClr>
-                  </a:outerShdw>
-                </a:effectLst>
-                <a:latin typeface="+mn-lt"/>
-                <a:ea typeface="+mn-ea"/>
-                <a:cs typeface="+mn-cs"/>
-              </a:defRPr>
-            </a:lvl2pPr>
-            <a:lvl3pPr marL="914400" algn="l" rtl="0" eaLnBrk="0" fontAlgn="base" hangingPunct="0">
-              <a:spcBef>
-                <a:spcPct val="0"/>
-              </a:spcBef>
-              <a:spcAft>
-                <a:spcPct val="0"/>
-              </a:spcAft>
-              <a:defRPr sz="2400" kern="1200">
-                <a:solidFill>
-                  <a:schemeClr val="lt1"/>
-                </a:solidFill>
-                <a:effectLst>
-                  <a:outerShdw blurRad="38100" dist="38100" dir="2700000" algn="tl">
-                    <a:srgbClr val="000000">
-                      <a:alpha val="43137"/>
-                    </a:srgbClr>
-                  </a:outerShdw>
-                </a:effectLst>
-                <a:latin typeface="+mn-lt"/>
-                <a:ea typeface="+mn-ea"/>
-                <a:cs typeface="+mn-cs"/>
-              </a:defRPr>
-            </a:lvl3pPr>
-            <a:lvl4pPr marL="1371600" algn="l" rtl="0" eaLnBrk="0" fontAlgn="base" hangingPunct="0">
-              <a:spcBef>
-                <a:spcPct val="0"/>
-              </a:spcBef>
-              <a:spcAft>
-                <a:spcPct val="0"/>
-              </a:spcAft>
-              <a:defRPr sz="2400" kern="1200">
-                <a:solidFill>
-                  <a:schemeClr val="lt1"/>
-                </a:solidFill>
-                <a:effectLst>
-                  <a:outerShdw blurRad="38100" dist="38100" dir="2700000" algn="tl">
-                    <a:srgbClr val="000000">
-                      <a:alpha val="43137"/>
-                    </a:srgbClr>
-                  </a:outerShdw>
-                </a:effectLst>
-                <a:latin typeface="+mn-lt"/>
-                <a:ea typeface="+mn-ea"/>
-                <a:cs typeface="+mn-cs"/>
-              </a:defRPr>
-            </a:lvl4pPr>
-            <a:lvl5pPr marL="1828800" algn="l" rtl="0" eaLnBrk="0" fontAlgn="base" hangingPunct="0">
-              <a:spcBef>
-                <a:spcPct val="0"/>
-              </a:spcBef>
-              <a:spcAft>
-                <a:spcPct val="0"/>
-              </a:spcAft>
-              <a:defRPr sz="2400" kern="1200">
-                <a:solidFill>
-                  <a:schemeClr val="lt1"/>
-                </a:solidFill>
-                <a:effectLst>
-                  <a:outerShdw blurRad="38100" dist="38100" dir="2700000" algn="tl">
-                    <a:srgbClr val="000000">
-                      <a:alpha val="43137"/>
-                    </a:srgbClr>
-                  </a:outerShdw>
-                </a:effectLst>
-                <a:latin typeface="+mn-lt"/>
-                <a:ea typeface="+mn-ea"/>
-                <a:cs typeface="+mn-cs"/>
-              </a:defRPr>
-            </a:lvl5pPr>
-            <a:lvl6pPr marL="2286000" algn="l" defTabSz="914400" rtl="0" eaLnBrk="1" latinLnBrk="0" hangingPunct="1">
-              <a:defRPr sz="2400" kern="1200">
-                <a:solidFill>
-                  <a:schemeClr val="lt1"/>
-                </a:solidFill>
-                <a:effectLst>
-                  <a:outerShdw blurRad="38100" dist="38100" dir="2700000" algn="tl">
-                    <a:srgbClr val="000000">
-                      <a:alpha val="43137"/>
-                    </a:srgbClr>
-                  </a:outerShdw>
-                </a:effectLst>
-                <a:latin typeface="+mn-lt"/>
-                <a:ea typeface="+mn-ea"/>
-                <a:cs typeface="+mn-cs"/>
-              </a:defRPr>
-            </a:lvl6pPr>
-            <a:lvl7pPr marL="2743200" algn="l" defTabSz="914400" rtl="0" eaLnBrk="1" latinLnBrk="0" hangingPunct="1">
-              <a:defRPr sz="2400" kern="1200">
-                <a:solidFill>
-                  <a:schemeClr val="lt1"/>
-                </a:solidFill>
-                <a:effectLst>
-                  <a:outerShdw blurRad="38100" dist="38100" dir="2700000" algn="tl">
-                    <a:srgbClr val="000000">
-                      <a:alpha val="43137"/>
-                    </a:srgbClr>
-                  </a:outerShdw>
-                </a:effectLst>
-                <a:latin typeface="+mn-lt"/>
-                <a:ea typeface="+mn-ea"/>
-                <a:cs typeface="+mn-cs"/>
-              </a:defRPr>
-            </a:lvl7pPr>
-            <a:lvl8pPr marL="3200400" algn="l" defTabSz="914400" rtl="0" eaLnBrk="1" latinLnBrk="0" hangingPunct="1">
-              <a:defRPr sz="2400" kern="1200">
-                <a:solidFill>
-                  <a:schemeClr val="lt1"/>
-                </a:solidFill>
-                <a:effectLst>
-                  <a:outerShdw blurRad="38100" dist="38100" dir="2700000" algn="tl">
-                    <a:srgbClr val="000000">
-                      <a:alpha val="43137"/>
-                    </a:srgbClr>
-                  </a:outerShdw>
-                </a:effectLst>
-                <a:latin typeface="+mn-lt"/>
-                <a:ea typeface="+mn-ea"/>
-                <a:cs typeface="+mn-cs"/>
-              </a:defRPr>
-            </a:lvl8pPr>
-            <a:lvl9pPr marL="3657600" algn="l" defTabSz="914400" rtl="0" eaLnBrk="1" latinLnBrk="0" hangingPunct="1">
-              <a:defRPr sz="2400" kern="1200">
-                <a:solidFill>
-                  <a:schemeClr val="lt1"/>
-                </a:solidFill>
-                <a:effectLst>
-                  <a:outerShdw blurRad="38100" dist="38100" dir="2700000" algn="tl">
-                    <a:srgbClr val="000000">
-                      <a:alpha val="43137"/>
-                    </a:srgbClr>
-                  </a:outerShdw>
-                </a:effectLst>
-                <a:latin typeface="+mn-lt"/>
-                <a:ea typeface="+mn-ea"/>
-                <a:cs typeface="+mn-cs"/>
-              </a:defRPr>
-            </a:lvl9pPr>
-          </a:lstStyle>
-          <a:p>
-            <a:pPr algn="ctr"/>
-            <a:endParaRPr lang="en-US" sz="9600" dirty="0">
-              <a:effectLst/>
-              <a:latin typeface="+mj-lt"/>
-            </a:endParaRPr>
-          </a:p>
-        </p:txBody>
-      </p:sp>
-      <p:sp>
-        <p:nvSpPr>
           <p:cNvPr id="48" name="Rectangle 47">
             <a:extLst>
               <a:ext uri="{FF2B5EF4-FFF2-40B4-BE49-F238E27FC236}">
@@ -5643,243 +5401,6 @@
       </p:sp>
       <p:sp>
         <p:nvSpPr>
-          <p:cNvPr id="47" name="Rectangle 46">
-            <a:extLst>
-              <a:ext uri="{FF2B5EF4-FFF2-40B4-BE49-F238E27FC236}">
-                <a16:creationId xmlns:a16="http://schemas.microsoft.com/office/drawing/2014/main" id="{868B6862-5CC5-4906-AC03-EA9661AD1346}"/>
-              </a:ext>
-            </a:extLst>
-          </p:cNvPr>
-          <p:cNvSpPr>
-            <a:spLocks noChangeArrowheads="1"/>
-          </p:cNvSpPr>
-          <p:nvPr/>
-        </p:nvSpPr>
-        <p:spPr bwMode="auto">
-          <a:xfrm>
-            <a:off x="761999" y="17973864"/>
-            <a:ext cx="20796332" cy="1126553"/>
-          </a:xfrm>
-          <a:prstGeom prst="rect">
-            <a:avLst/>
-          </a:prstGeom>
-          <a:solidFill>
-            <a:schemeClr val="accent5"/>
-          </a:solidFill>
-          <a:ln w="12700">
-            <a:noFill/>
-            <a:miter lim="800000"/>
-          </a:ln>
-        </p:spPr>
-        <p:txBody>
-          <a:bodyPr wrap="none" lIns="274320" tIns="73152" rIns="274320" bIns="68563" anchor="ctr" anchorCtr="0"/>
-          <a:lstStyle>
-            <a:defPPr>
-              <a:defRPr lang="en-US"/>
-            </a:defPPr>
-            <a:lvl1pPr algn="l" rtl="0" eaLnBrk="0" fontAlgn="base" hangingPunct="0">
-              <a:spcBef>
-                <a:spcPct val="0"/>
-              </a:spcBef>
-              <a:spcAft>
-                <a:spcPct val="0"/>
-              </a:spcAft>
-              <a:defRPr sz="2400" kern="1200">
-                <a:solidFill>
-                  <a:schemeClr val="tx1"/>
-                </a:solidFill>
-                <a:effectLst>
-                  <a:outerShdw blurRad="38100" dist="38100" dir="2700000" algn="tl">
-                    <a:srgbClr val="000000">
-                      <a:alpha val="43137"/>
-                    </a:srgbClr>
-                  </a:outerShdw>
-                </a:effectLst>
-                <a:latin typeface="Times New Roman" pitchFamily="18" charset="0"/>
-                <a:ea typeface="+mn-ea"/>
-                <a:cs typeface="+mn-cs"/>
-              </a:defRPr>
-            </a:lvl1pPr>
-            <a:lvl2pPr marL="457200" algn="l" rtl="0" eaLnBrk="0" fontAlgn="base" hangingPunct="0">
-              <a:spcBef>
-                <a:spcPct val="0"/>
-              </a:spcBef>
-              <a:spcAft>
-                <a:spcPct val="0"/>
-              </a:spcAft>
-              <a:defRPr sz="2400" kern="1200">
-                <a:solidFill>
-                  <a:schemeClr val="tx1"/>
-                </a:solidFill>
-                <a:effectLst>
-                  <a:outerShdw blurRad="38100" dist="38100" dir="2700000" algn="tl">
-                    <a:srgbClr val="000000">
-                      <a:alpha val="43137"/>
-                    </a:srgbClr>
-                  </a:outerShdw>
-                </a:effectLst>
-                <a:latin typeface="Times New Roman" pitchFamily="18" charset="0"/>
-                <a:ea typeface="+mn-ea"/>
-                <a:cs typeface="+mn-cs"/>
-              </a:defRPr>
-            </a:lvl2pPr>
-            <a:lvl3pPr marL="914400" algn="l" rtl="0" eaLnBrk="0" fontAlgn="base" hangingPunct="0">
-              <a:spcBef>
-                <a:spcPct val="0"/>
-              </a:spcBef>
-              <a:spcAft>
-                <a:spcPct val="0"/>
-              </a:spcAft>
-              <a:defRPr sz="2400" kern="1200">
-                <a:solidFill>
-                  <a:schemeClr val="tx1"/>
-                </a:solidFill>
-                <a:effectLst>
-                  <a:outerShdw blurRad="38100" dist="38100" dir="2700000" algn="tl">
-                    <a:srgbClr val="000000">
-                      <a:alpha val="43137"/>
-                    </a:srgbClr>
-                  </a:outerShdw>
-                </a:effectLst>
-                <a:latin typeface="Times New Roman" pitchFamily="18" charset="0"/>
-                <a:ea typeface="+mn-ea"/>
-                <a:cs typeface="+mn-cs"/>
-              </a:defRPr>
-            </a:lvl3pPr>
-            <a:lvl4pPr marL="1371600" algn="l" rtl="0" eaLnBrk="0" fontAlgn="base" hangingPunct="0">
-              <a:spcBef>
-                <a:spcPct val="0"/>
-              </a:spcBef>
-              <a:spcAft>
-                <a:spcPct val="0"/>
-              </a:spcAft>
-              <a:defRPr sz="2400" kern="1200">
-                <a:solidFill>
-                  <a:schemeClr val="tx1"/>
-                </a:solidFill>
-                <a:effectLst>
-                  <a:outerShdw blurRad="38100" dist="38100" dir="2700000" algn="tl">
-                    <a:srgbClr val="000000">
-                      <a:alpha val="43137"/>
-                    </a:srgbClr>
-                  </a:outerShdw>
-                </a:effectLst>
-                <a:latin typeface="Times New Roman" pitchFamily="18" charset="0"/>
-                <a:ea typeface="+mn-ea"/>
-                <a:cs typeface="+mn-cs"/>
-              </a:defRPr>
-            </a:lvl4pPr>
-            <a:lvl5pPr marL="1828800" algn="l" rtl="0" eaLnBrk="0" fontAlgn="base" hangingPunct="0">
-              <a:spcBef>
-                <a:spcPct val="0"/>
-              </a:spcBef>
-              <a:spcAft>
-                <a:spcPct val="0"/>
-              </a:spcAft>
-              <a:defRPr sz="2400" kern="1200">
-                <a:solidFill>
-                  <a:schemeClr val="tx1"/>
-                </a:solidFill>
-                <a:effectLst>
-                  <a:outerShdw blurRad="38100" dist="38100" dir="2700000" algn="tl">
-                    <a:srgbClr val="000000">
-                      <a:alpha val="43137"/>
-                    </a:srgbClr>
-                  </a:outerShdw>
-                </a:effectLst>
-                <a:latin typeface="Times New Roman" pitchFamily="18" charset="0"/>
-                <a:ea typeface="+mn-ea"/>
-                <a:cs typeface="+mn-cs"/>
-              </a:defRPr>
-            </a:lvl5pPr>
-            <a:lvl6pPr marL="2286000" algn="l" defTabSz="914400" rtl="0" eaLnBrk="1" latinLnBrk="0" hangingPunct="1">
-              <a:defRPr sz="2400" kern="1200">
-                <a:solidFill>
-                  <a:schemeClr val="tx1"/>
-                </a:solidFill>
-                <a:effectLst>
-                  <a:outerShdw blurRad="38100" dist="38100" dir="2700000" algn="tl">
-                    <a:srgbClr val="000000">
-                      <a:alpha val="43137"/>
-                    </a:srgbClr>
-                  </a:outerShdw>
-                </a:effectLst>
-                <a:latin typeface="Times New Roman" pitchFamily="18" charset="0"/>
-                <a:ea typeface="+mn-ea"/>
-                <a:cs typeface="+mn-cs"/>
-              </a:defRPr>
-            </a:lvl6pPr>
-            <a:lvl7pPr marL="2743200" algn="l" defTabSz="914400" rtl="0" eaLnBrk="1" latinLnBrk="0" hangingPunct="1">
-              <a:defRPr sz="2400" kern="1200">
-                <a:solidFill>
-                  <a:schemeClr val="tx1"/>
-                </a:solidFill>
-                <a:effectLst>
-                  <a:outerShdw blurRad="38100" dist="38100" dir="2700000" algn="tl">
-                    <a:srgbClr val="000000">
-                      <a:alpha val="43137"/>
-                    </a:srgbClr>
-                  </a:outerShdw>
-                </a:effectLst>
-                <a:latin typeface="Times New Roman" pitchFamily="18" charset="0"/>
-                <a:ea typeface="+mn-ea"/>
-                <a:cs typeface="+mn-cs"/>
-              </a:defRPr>
-            </a:lvl7pPr>
-            <a:lvl8pPr marL="3200400" algn="l" defTabSz="914400" rtl="0" eaLnBrk="1" latinLnBrk="0" hangingPunct="1">
-              <a:defRPr sz="2400" kern="1200">
-                <a:solidFill>
-                  <a:schemeClr val="tx1"/>
-                </a:solidFill>
-                <a:effectLst>
-                  <a:outerShdw blurRad="38100" dist="38100" dir="2700000" algn="tl">
-                    <a:srgbClr val="000000">
-                      <a:alpha val="43137"/>
-                    </a:srgbClr>
-                  </a:outerShdw>
-                </a:effectLst>
-                <a:latin typeface="Times New Roman" pitchFamily="18" charset="0"/>
-                <a:ea typeface="+mn-ea"/>
-                <a:cs typeface="+mn-cs"/>
-              </a:defRPr>
-            </a:lvl8pPr>
-            <a:lvl9pPr marL="3657600" algn="l" defTabSz="914400" rtl="0" eaLnBrk="1" latinLnBrk="0" hangingPunct="1">
-              <a:defRPr sz="2400" kern="1200">
-                <a:solidFill>
-                  <a:schemeClr val="tx1"/>
-                </a:solidFill>
-                <a:effectLst>
-                  <a:outerShdw blurRad="38100" dist="38100" dir="2700000" algn="tl">
-                    <a:srgbClr val="000000">
-                      <a:alpha val="43137"/>
-                    </a:srgbClr>
-                  </a:outerShdw>
-                </a:effectLst>
-                <a:latin typeface="Times New Roman" pitchFamily="18" charset="0"/>
-                <a:ea typeface="+mn-ea"/>
-                <a:cs typeface="+mn-cs"/>
-              </a:defRPr>
-            </a:lvl9pPr>
-          </a:lstStyle>
-          <a:p>
-            <a:pPr defTabSz="4702588">
-              <a:defRPr/>
-            </a:pPr>
-            <a:r>
-              <a:rPr lang="en-US" sz="4200" dirty="0">
-                <a:solidFill>
-                  <a:schemeClr val="bg1"/>
-                </a:solidFill>
-                <a:effectLst/>
-                <a:latin typeface="Amaranth" panose="02000503050000020004" pitchFamily="2" charset="0"/>
-              </a:rPr>
-              <a:t>Current Work</a:t>
-            </a:r>
-          </a:p>
-        </p:txBody>
-      </p:sp>
-      <p:sp>
-        <p:nvSpPr>
           <p:cNvPr id="24" name="Rectangle 23">
             <a:extLst>
               <a:ext uri="{FF2B5EF4-FFF2-40B4-BE49-F238E27FC236}">
@@ -6117,178 +5638,6 @@
       </p:sp>
       <p:sp>
         <p:nvSpPr>
-          <p:cNvPr id="25" name="Text Box 6">
-            <a:extLst>
-              <a:ext uri="{FF2B5EF4-FFF2-40B4-BE49-F238E27FC236}">
-                <a16:creationId xmlns:a16="http://schemas.microsoft.com/office/drawing/2014/main" id="{2A6CBB32-D161-4EB7-AF81-93A891791662}"/>
-              </a:ext>
-            </a:extLst>
-          </p:cNvPr>
-          <p:cNvSpPr txBox="1">
-            <a:spLocks noChangeArrowheads="1"/>
-          </p:cNvSpPr>
-          <p:nvPr/>
-        </p:nvSpPr>
-        <p:spPr bwMode="auto">
-          <a:xfrm>
-            <a:off x="22479000" y="16589672"/>
-            <a:ext cx="20269199" cy="692497"/>
-          </a:xfrm>
-          <a:prstGeom prst="rect">
-            <a:avLst/>
-          </a:prstGeom>
-          <a:noFill/>
-          <a:ln>
-            <a:noFill/>
-          </a:ln>
-          <a:extLst>
-            <a:ext uri="{909E8E84-426E-40DD-AFC4-6F175D3DCCD1}">
-              <a14:hiddenFill xmlns:a14="http://schemas.microsoft.com/office/drawing/2010/main">
-                <a:solidFill>
-                  <a:schemeClr val="accent1"/>
-                </a:solidFill>
-              </a14:hiddenFill>
-            </a:ext>
-            <a:ext uri="{91240B29-F687-4F45-9708-019B960494DF}">
-              <a14:hiddenLine xmlns:a14="http://schemas.microsoft.com/office/drawing/2010/main" w="9525">
-                <a:solidFill>
-                  <a:schemeClr val="tx1"/>
-                </a:solidFill>
-                <a:miter lim="800000"/>
-                <a:headEnd/>
-                <a:tailEnd/>
-              </a14:hiddenLine>
-            </a:ext>
-            <a:ext uri="{AF507438-7753-43E0-B8FC-AC1667EBCBE1}">
-              <a14:hiddenEffects xmlns:a14="http://schemas.microsoft.com/office/drawing/2010/main">
-                <a:effectLst>
-                  <a:outerShdw dist="35921" dir="2700000" algn="ctr" rotWithShape="0">
-                    <a:schemeClr val="bg2"/>
-                  </a:outerShdw>
-                </a:effectLst>
-              </a14:hiddenEffects>
-            </a:ext>
-          </a:extLst>
-        </p:spPr>
-        <p:txBody>
-          <a:bodyPr wrap="square" lIns="137160" tIns="68580" rIns="137160" bIns="68580">
-            <a:spAutoFit/>
-          </a:bodyPr>
-          <a:lstStyle>
-            <a:defPPr>
-              <a:defRPr kern="1200" smtId="4294967295"/>
-            </a:defPPr>
-            <a:lvl1pPr defTabSz="4703763" eaLnBrk="0" hangingPunct="0">
-              <a:defRPr sz="9300">
-                <a:solidFill>
-                  <a:schemeClr val="tx1"/>
-                </a:solidFill>
-                <a:latin typeface="Arial"/>
-              </a:defRPr>
-            </a:lvl1pPr>
-            <a:lvl2pPr marL="742950" indent="-285750" defTabSz="4703763" eaLnBrk="0" hangingPunct="0">
-              <a:defRPr sz="9300">
-                <a:solidFill>
-                  <a:schemeClr val="tx1"/>
-                </a:solidFill>
-                <a:latin typeface="Arial"/>
-              </a:defRPr>
-            </a:lvl2pPr>
-            <a:lvl3pPr marL="1143000" indent="-228600" defTabSz="4703763" eaLnBrk="0" hangingPunct="0">
-              <a:defRPr sz="9300">
-                <a:solidFill>
-                  <a:schemeClr val="tx1"/>
-                </a:solidFill>
-                <a:latin typeface="Arial"/>
-              </a:defRPr>
-            </a:lvl3pPr>
-            <a:lvl4pPr marL="1600200" indent="-228600" defTabSz="4703763" eaLnBrk="0" hangingPunct="0">
-              <a:defRPr sz="9300">
-                <a:solidFill>
-                  <a:schemeClr val="tx1"/>
-                </a:solidFill>
-                <a:latin typeface="Arial"/>
-              </a:defRPr>
-            </a:lvl4pPr>
-            <a:lvl5pPr marL="2057400" indent="-228600" defTabSz="4703763" eaLnBrk="0" hangingPunct="0">
-              <a:defRPr sz="9300">
-                <a:solidFill>
-                  <a:schemeClr val="tx1"/>
-                </a:solidFill>
-                <a:latin typeface="Arial"/>
-              </a:defRPr>
-            </a:lvl5pPr>
-            <a:lvl6pPr marL="2514600" indent="-228600" defTabSz="4703763" eaLnBrk="0" fontAlgn="base" hangingPunct="0">
-              <a:spcBef>
-                <a:spcPct val="0"/>
-              </a:spcBef>
-              <a:spcAft>
-                <a:spcPct val="0"/>
-              </a:spcAft>
-              <a:defRPr sz="9300">
-                <a:solidFill>
-                  <a:schemeClr val="tx1"/>
-                </a:solidFill>
-                <a:latin typeface="Arial"/>
-              </a:defRPr>
-            </a:lvl6pPr>
-            <a:lvl7pPr marL="2971800" indent="-228600" defTabSz="4703763" eaLnBrk="0" fontAlgn="base" hangingPunct="0">
-              <a:spcBef>
-                <a:spcPct val="0"/>
-              </a:spcBef>
-              <a:spcAft>
-                <a:spcPct val="0"/>
-              </a:spcAft>
-              <a:defRPr sz="9300">
-                <a:solidFill>
-                  <a:schemeClr val="tx1"/>
-                </a:solidFill>
-                <a:latin typeface="Arial"/>
-              </a:defRPr>
-            </a:lvl7pPr>
-            <a:lvl8pPr marL="3429000" indent="-228600" defTabSz="4703763" eaLnBrk="0" fontAlgn="base" hangingPunct="0">
-              <a:spcBef>
-                <a:spcPct val="0"/>
-              </a:spcBef>
-              <a:spcAft>
-                <a:spcPct val="0"/>
-              </a:spcAft>
-              <a:defRPr sz="9300">
-                <a:solidFill>
-                  <a:schemeClr val="tx1"/>
-                </a:solidFill>
-                <a:latin typeface="Arial"/>
-              </a:defRPr>
-            </a:lvl8pPr>
-            <a:lvl9pPr marL="3886200" indent="-228600" defTabSz="4703763" eaLnBrk="0" fontAlgn="base" hangingPunct="0">
-              <a:spcBef>
-                <a:spcPct val="0"/>
-              </a:spcBef>
-              <a:spcAft>
-                <a:spcPct val="0"/>
-              </a:spcAft>
-              <a:defRPr sz="9300">
-                <a:solidFill>
-                  <a:schemeClr val="tx1"/>
-                </a:solidFill>
-                <a:latin typeface="Arial"/>
-              </a:defRPr>
-            </a:lvl9pPr>
-          </a:lstStyle>
-          <a:p>
-            <a:r>
-              <a:rPr lang="en-US" sz="3600" dirty="0">
-                <a:latin typeface="Titillium Web" panose="00000500000000000000" pitchFamily="2" charset="0"/>
-                <a:ea typeface="Open Sans" panose="020B0606030504020204" pitchFamily="34" charset="0"/>
-                <a:cs typeface="Open Sans" panose="020B0606030504020204" pitchFamily="34" charset="0"/>
-              </a:rPr>
-              <a:t>Add your information, graphs and images to this section.</a:t>
-            </a:r>
-          </a:p>
-        </p:txBody>
-      </p:sp>
-      <p:sp>
-        <p:nvSpPr>
           <p:cNvPr id="26" name="Rectangle 25">
             <a:extLst>
               <a:ext uri="{FF2B5EF4-FFF2-40B4-BE49-F238E27FC236}">
@@ -6301,8 +5650,8 @@
         </p:nvSpPr>
         <p:spPr>
           <a:xfrm>
-            <a:off x="762000" y="804334"/>
-            <a:ext cx="20796332" cy="15350066"/>
+            <a:off x="762000" y="804333"/>
+            <a:ext cx="20796332" cy="27832093"/>
           </a:xfrm>
           <a:prstGeom prst="rect">
             <a:avLst/>
@@ -6933,7 +6282,7 @@
                 <a:ea typeface="Open Sans" panose="020B0606030504020204" pitchFamily="34" charset="0"/>
                 <a:cs typeface="Open Sans" panose="020B0606030504020204" pitchFamily="34" charset="0"/>
               </a:rPr>
-              <a:t>OpenNeuroPET is focused on creating the infrastructure to guide research data into BIDS, but what does that look like?</a:t>
+              <a:t>OpenNeuroPET is focused on creating the infrastructure to guide PET research data into BIDS, but what does that look like?</a:t>
             </a:r>
           </a:p>
           <a:p>
@@ -7109,8 +6458,8 @@
         </p:blipFill>
         <p:spPr>
           <a:xfrm>
-            <a:off x="38876372" y="10301370"/>
-            <a:ext cx="3452729" cy="3452729"/>
+            <a:off x="15443866" y="22581740"/>
+            <a:ext cx="4953000" cy="4953000"/>
           </a:xfrm>
           <a:prstGeom prst="rect">
             <a:avLst/>
@@ -7145,7 +6494,7 @@
         </p:blipFill>
         <p:spPr>
           <a:xfrm>
-            <a:off x="5443105" y="3152835"/>
+            <a:off x="5894764" y="4401856"/>
             <a:ext cx="3488451" cy="3804248"/>
           </a:xfrm>
           <a:prstGeom prst="rect">
@@ -7181,7 +6530,7 @@
         </p:blipFill>
         <p:spPr>
           <a:xfrm>
-            <a:off x="9533866" y="3152835"/>
+            <a:off x="9779595" y="4397095"/>
             <a:ext cx="3277190" cy="5877570"/>
           </a:xfrm>
           <a:prstGeom prst="rect">
@@ -7217,7 +6566,7 @@
         </p:blipFill>
         <p:spPr>
           <a:xfrm>
-            <a:off x="13413367" y="3152835"/>
+            <a:off x="13413367" y="4401860"/>
             <a:ext cx="7748586" cy="6415342"/>
           </a:xfrm>
           <a:prstGeom prst="rect">
@@ -7243,12 +6592,12 @@
         </p:nvCxnSpPr>
         <p:spPr bwMode="auto">
           <a:xfrm rot="16200000" flipH="1">
-            <a:off x="13961174" y="6241691"/>
-            <a:ext cx="537772" cy="6115199"/>
+            <a:off x="14081657" y="7611198"/>
+            <a:ext cx="542537" cy="5869470"/>
           </a:xfrm>
           <a:prstGeom prst="bentConnector3">
             <a:avLst>
-              <a:gd name="adj1" fmla="val 142509"/>
+              <a:gd name="adj1" fmla="val 142135"/>
             </a:avLst>
           </a:prstGeom>
           <a:solidFill>
@@ -7291,8 +6640,8 @@
         </p:nvSpPr>
         <p:spPr>
           <a:xfrm>
-            <a:off x="1180631" y="3581400"/>
-            <a:ext cx="3773995" cy="6370975"/>
+            <a:off x="1229647" y="4395827"/>
+            <a:ext cx="3866095" cy="6740307"/>
           </a:xfrm>
           <a:prstGeom prst="rect">
             <a:avLst/>
@@ -7307,7 +6656,7 @@
           <a:p>
             <a:r>
               <a:rPr lang="en-US" sz="2400" dirty="0"/>
-              <a:t>One of the first steps to increasing the shareability of PET data was the inclusion of PET into the popular brain imaging data structure BIDS [1]  with BEP009 [2]. A standardized data format makes sharing different datasets simpler as part of the data dictionary is included in the file structure itself. Modalities follow a standard scheme and additional metadata is included in json or tab separated text files.  </a:t>
+              <a:t>One of the first steps to increasing the shareability of PET data was the inclusion of PET into the popular brain imaging data structure BIDS [1]  with the BIDS extension proposal 009 (BEP009 [2]). A standardized data format makes sharing different datasets simpler as part of the data dictionary is included in the file structure itself. Modalities follow a standard scheme and additional metadata is included in json or tab separated text files.  </a:t>
             </a:r>
           </a:p>
         </p:txBody>
@@ -7323,19 +6672,19 @@
           </p:cNvPr>
           <p:cNvCxnSpPr>
             <a:cxnSpLocks/>
+            <a:stCxn id="58" idx="2"/>
             <a:endCxn id="62" idx="2"/>
           </p:cNvCxnSpPr>
           <p:nvPr/>
         </p:nvCxnSpPr>
         <p:spPr bwMode="auto">
-          <a:xfrm>
-            <a:off x="7187331" y="6919138"/>
-            <a:ext cx="10100329" cy="2649039"/>
+          <a:xfrm rot="16200000" flipH="1">
+            <a:off x="11157776" y="4687318"/>
+            <a:ext cx="2611098" cy="9648670"/>
           </a:xfrm>
-          <a:prstGeom prst="bentConnector4">
+          <a:prstGeom prst="bentConnector3">
             <a:avLst>
-              <a:gd name="adj1" fmla="val 15"/>
-              <a:gd name="adj2" fmla="val 108630"/>
+              <a:gd name="adj1" fmla="val 108755"/>
             </a:avLst>
           </a:prstGeom>
           <a:solidFill>
@@ -7378,7 +6727,7 @@
         </p:nvSpPr>
         <p:spPr>
           <a:xfrm>
-            <a:off x="5408181" y="7046655"/>
+            <a:off x="5870278" y="8295680"/>
             <a:ext cx="1673522" cy="2554545"/>
           </a:xfrm>
           <a:prstGeom prst="rect">
@@ -7395,41 +6744,6 @@
             <a:r>
               <a:rPr lang="en-US" sz="1600" dirty="0"/>
               <a:t>Organizing these datasets into the standardized BIDS set on the right leads to easier classification for humans and machines alike.</a:t>
-            </a:r>
-          </a:p>
-        </p:txBody>
-      </p:sp>
-      <p:sp>
-        <p:nvSpPr>
-          <p:cNvPr id="72" name="TextBox 71">
-            <a:extLst>
-              <a:ext uri="{FF2B5EF4-FFF2-40B4-BE49-F238E27FC236}">
-                <a16:creationId xmlns:a16="http://schemas.microsoft.com/office/drawing/2014/main" id="{C4690C7B-4C97-6047-96A2-2B78DF514462}"/>
-              </a:ext>
-            </a:extLst>
-          </p:cNvPr>
-          <p:cNvSpPr txBox="1"/>
-          <p:nvPr/>
-        </p:nvSpPr>
-        <p:spPr>
-          <a:xfrm>
-            <a:off x="7576652" y="7046655"/>
-            <a:ext cx="1910324" cy="1815882"/>
-          </a:xfrm>
-          <a:prstGeom prst="rect">
-            <a:avLst/>
-          </a:prstGeom>
-          <a:noFill/>
-        </p:spPr>
-        <p:txBody>
-          <a:bodyPr wrap="square" rtlCol="0">
-            <a:spAutoFit/>
-          </a:bodyPr>
-          <a:lstStyle/>
-          <a:p>
-            <a:r>
-              <a:rPr lang="en-US" sz="1600" dirty="0"/>
-              <a:t>Applying BIDS to PET data reduces the imaging file count in the and standardizes both imaging and physiological data.</a:t>
             </a:r>
           </a:p>
         </p:txBody>
@@ -7462,7 +6776,7 @@
         </p:blipFill>
         <p:spPr>
           <a:xfrm>
-            <a:off x="5594268" y="10458199"/>
+            <a:off x="5578971" y="11943481"/>
             <a:ext cx="7588250" cy="4667832"/>
           </a:xfrm>
           <a:prstGeom prst="rect">
@@ -7498,7 +6812,7 @@
         </p:blipFill>
         <p:spPr>
           <a:xfrm>
-            <a:off x="13589000" y="10458199"/>
+            <a:off x="13573703" y="11943481"/>
             <a:ext cx="7588250" cy="4667832"/>
           </a:xfrm>
           <a:prstGeom prst="rect">
@@ -7520,8 +6834,8 @@
         </p:nvSpPr>
         <p:spPr>
           <a:xfrm>
-            <a:off x="1180631" y="10301370"/>
-            <a:ext cx="3384937" cy="4893647"/>
+            <a:off x="1165334" y="11811000"/>
+            <a:ext cx="4007155" cy="3785652"/>
           </a:xfrm>
           <a:prstGeom prst="rect">
             <a:avLst/>
@@ -7538,6 +6852,1167 @@
               <a:rPr lang="en-US" sz="2400" dirty="0"/>
               <a:t>Once a PET dataset is converted into BIDS it can be uploaded, browsed, and downloaded via a browser (or the command line). The BIDS Validator will tell you if the dataset is valid and you can collect, view, or run analysis on this standardized structure.</a:t>
             </a:r>
+          </a:p>
+        </p:txBody>
+      </p:sp>
+      <p:pic>
+        <p:nvPicPr>
+          <p:cNvPr id="82" name="Graphic 81" descr="To learn more about BIDS.">
+            <a:extLst>
+              <a:ext uri="{FF2B5EF4-FFF2-40B4-BE49-F238E27FC236}">
+                <a16:creationId xmlns:a16="http://schemas.microsoft.com/office/drawing/2014/main" id="{F9D67FDB-23D2-D14E-984F-186CE25B15DE}"/>
+              </a:ext>
+              <a:ext uri="{C183D7F6-B498-43B3-948B-1728B52AA6E4}">
+                <adec:decorative xmlns:adec="http://schemas.microsoft.com/office/drawing/2017/decorative" val="0"/>
+              </a:ext>
+            </a:extLst>
+          </p:cNvPr>
+          <p:cNvPicPr>
+            <a:picLocks noChangeAspect="1"/>
+          </p:cNvPicPr>
+          <p:nvPr/>
+        </p:nvPicPr>
+        <p:blipFill>
+          <a:blip r:embed="rId10">
+            <a:extLst>
+              <a:ext uri="{28A0092B-C50C-407E-A947-70E740481C1C}">
+                <a14:useLocalDpi xmlns:a14="http://schemas.microsoft.com/office/drawing/2010/main" val="0"/>
+              </a:ext>
+              <a:ext uri="{96DAC541-7B7A-43D3-8B79-37D633B846F1}">
+                <asvg:svgBlip xmlns:asvg="http://schemas.microsoft.com/office/drawing/2016/SVG/main" r:embed="rId11"/>
+              </a:ext>
+            </a:extLst>
+          </a:blip>
+          <a:stretch>
+            <a:fillRect/>
+          </a:stretch>
+        </p:blipFill>
+        <p:spPr>
+          <a:xfrm>
+            <a:off x="8178338" y="17076977"/>
+            <a:ext cx="2411449" cy="2411449"/>
+          </a:xfrm>
+          <a:prstGeom prst="rect">
+            <a:avLst/>
+          </a:prstGeom>
+        </p:spPr>
+      </p:pic>
+      <p:pic>
+        <p:nvPicPr>
+          <p:cNvPr id="84" name="Graphic 83">
+            <a:extLst>
+              <a:ext uri="{FF2B5EF4-FFF2-40B4-BE49-F238E27FC236}">
+                <a16:creationId xmlns:a16="http://schemas.microsoft.com/office/drawing/2014/main" id="{89983B40-17F8-8C4A-A059-946C522CFAF6}"/>
+              </a:ext>
+            </a:extLst>
+          </p:cNvPr>
+          <p:cNvPicPr>
+            <a:picLocks noChangeAspect="1"/>
+          </p:cNvPicPr>
+          <p:nvPr/>
+        </p:nvPicPr>
+        <p:blipFill>
+          <a:blip r:embed="rId12">
+            <a:extLst>
+              <a:ext uri="{28A0092B-C50C-407E-A947-70E740481C1C}">
+                <a14:useLocalDpi xmlns:a14="http://schemas.microsoft.com/office/drawing/2010/main" val="0"/>
+              </a:ext>
+              <a:ext uri="{96DAC541-7B7A-43D3-8B79-37D633B846F1}">
+                <asvg:svgBlip xmlns:asvg="http://schemas.microsoft.com/office/drawing/2016/SVG/main" r:embed="rId13"/>
+              </a:ext>
+            </a:extLst>
+          </a:blip>
+          <a:stretch>
+            <a:fillRect/>
+          </a:stretch>
+        </p:blipFill>
+        <p:spPr>
+          <a:xfrm>
+            <a:off x="16385428" y="17076977"/>
+            <a:ext cx="2411448" cy="2411448"/>
+          </a:xfrm>
+          <a:prstGeom prst="rect">
+            <a:avLst/>
+          </a:prstGeom>
+        </p:spPr>
+      </p:pic>
+      <p:sp>
+        <p:nvSpPr>
+          <p:cNvPr id="85" name="TextBox 84">
+            <a:extLst>
+              <a:ext uri="{FF2B5EF4-FFF2-40B4-BE49-F238E27FC236}">
+                <a16:creationId xmlns:a16="http://schemas.microsoft.com/office/drawing/2014/main" id="{881A515A-A346-054D-9C0F-1DA30183323A}"/>
+              </a:ext>
+            </a:extLst>
+          </p:cNvPr>
+          <p:cNvSpPr txBox="1"/>
+          <p:nvPr/>
+        </p:nvSpPr>
+        <p:spPr>
+          <a:xfrm>
+            <a:off x="6144705" y="17792359"/>
+            <a:ext cx="1797604" cy="830997"/>
+          </a:xfrm>
+          <a:prstGeom prst="rect">
+            <a:avLst/>
+          </a:prstGeom>
+          <a:noFill/>
+        </p:spPr>
+        <p:txBody>
+          <a:bodyPr wrap="square" rtlCol="0">
+            <a:spAutoFit/>
+          </a:bodyPr>
+          <a:lstStyle/>
+          <a:p>
+            <a:r>
+              <a:rPr lang="en-US" sz="2400" dirty="0"/>
+              <a:t>Learn more about BIDS</a:t>
+            </a:r>
+          </a:p>
+        </p:txBody>
+      </p:sp>
+      <p:sp>
+        <p:nvSpPr>
+          <p:cNvPr id="86" name="TextBox 85">
+            <a:extLst>
+              <a:ext uri="{FF2B5EF4-FFF2-40B4-BE49-F238E27FC236}">
+                <a16:creationId xmlns:a16="http://schemas.microsoft.com/office/drawing/2014/main" id="{1F9A5D7C-C190-964E-A43C-A8C6EEE20E9D}"/>
+              </a:ext>
+            </a:extLst>
+          </p:cNvPr>
+          <p:cNvSpPr txBox="1"/>
+          <p:nvPr/>
+        </p:nvSpPr>
+        <p:spPr>
+          <a:xfrm>
+            <a:off x="14459845" y="17795330"/>
+            <a:ext cx="1797604" cy="830997"/>
+          </a:xfrm>
+          <a:prstGeom prst="rect">
+            <a:avLst/>
+          </a:prstGeom>
+          <a:noFill/>
+        </p:spPr>
+        <p:txBody>
+          <a:bodyPr wrap="square" rtlCol="0">
+            <a:spAutoFit/>
+          </a:bodyPr>
+          <a:lstStyle/>
+          <a:p>
+            <a:r>
+              <a:rPr lang="en-US" sz="2400" dirty="0"/>
+              <a:t>Read about  BEP009</a:t>
+            </a:r>
+          </a:p>
+        </p:txBody>
+      </p:sp>
+      <p:sp>
+        <p:nvSpPr>
+          <p:cNvPr id="87" name="TextBox 86">
+            <a:extLst>
+              <a:ext uri="{FF2B5EF4-FFF2-40B4-BE49-F238E27FC236}">
+                <a16:creationId xmlns:a16="http://schemas.microsoft.com/office/drawing/2014/main" id="{3FF71699-86AE-8C4C-BDD5-D659CD3B3471}"/>
+              </a:ext>
+            </a:extLst>
+          </p:cNvPr>
+          <p:cNvSpPr txBox="1"/>
+          <p:nvPr/>
+        </p:nvSpPr>
+        <p:spPr>
+          <a:xfrm>
+            <a:off x="26623070" y="21110956"/>
+            <a:ext cx="2411448" cy="830997"/>
+          </a:xfrm>
+          <a:prstGeom prst="rect">
+            <a:avLst/>
+          </a:prstGeom>
+          <a:noFill/>
+        </p:spPr>
+        <p:txBody>
+          <a:bodyPr wrap="square" rtlCol="0">
+            <a:spAutoFit/>
+          </a:bodyPr>
+          <a:lstStyle/>
+          <a:p>
+            <a:r>
+              <a:rPr lang="en-US" sz="2400" dirty="0"/>
+              <a:t>Use a PET BIDS Converter</a:t>
+            </a:r>
+          </a:p>
+        </p:txBody>
+      </p:sp>
+      <p:pic>
+        <p:nvPicPr>
+          <p:cNvPr id="89" name="Graphic 88">
+            <a:extLst>
+              <a:ext uri="{FF2B5EF4-FFF2-40B4-BE49-F238E27FC236}">
+                <a16:creationId xmlns:a16="http://schemas.microsoft.com/office/drawing/2014/main" id="{41CFDEA2-35C5-EA45-831A-3F4CE9D7A4D9}"/>
+              </a:ext>
+            </a:extLst>
+          </p:cNvPr>
+          <p:cNvPicPr>
+            <a:picLocks noChangeAspect="1"/>
+          </p:cNvPicPr>
+          <p:nvPr/>
+        </p:nvPicPr>
+        <p:blipFill>
+          <a:blip r:embed="rId14">
+            <a:extLst>
+              <a:ext uri="{28A0092B-C50C-407E-A947-70E740481C1C}">
+                <a14:useLocalDpi xmlns:a14="http://schemas.microsoft.com/office/drawing/2010/main" val="0"/>
+              </a:ext>
+              <a:ext uri="{96DAC541-7B7A-43D3-8B79-37D633B846F1}">
+                <asvg:svgBlip xmlns:asvg="http://schemas.microsoft.com/office/drawing/2016/SVG/main" r:embed="rId15"/>
+              </a:ext>
+            </a:extLst>
+          </a:blip>
+          <a:stretch>
+            <a:fillRect/>
+          </a:stretch>
+        </p:blipFill>
+        <p:spPr>
+          <a:xfrm>
+            <a:off x="26455346" y="21919769"/>
+            <a:ext cx="2411448" cy="2411448"/>
+          </a:xfrm>
+          <a:prstGeom prst="rect">
+            <a:avLst/>
+          </a:prstGeom>
+        </p:spPr>
+      </p:pic>
+      <p:pic>
+        <p:nvPicPr>
+          <p:cNvPr id="91" name="Graphic 90">
+            <a:extLst>
+              <a:ext uri="{FF2B5EF4-FFF2-40B4-BE49-F238E27FC236}">
+                <a16:creationId xmlns:a16="http://schemas.microsoft.com/office/drawing/2014/main" id="{812BC1B7-651D-E845-AEC7-EC58449CD757}"/>
+              </a:ext>
+            </a:extLst>
+          </p:cNvPr>
+          <p:cNvPicPr>
+            <a:picLocks noChangeAspect="1"/>
+          </p:cNvPicPr>
+          <p:nvPr/>
+        </p:nvPicPr>
+        <p:blipFill>
+          <a:blip r:embed="rId16">
+            <a:extLst>
+              <a:ext uri="{28A0092B-C50C-407E-A947-70E740481C1C}">
+                <a14:useLocalDpi xmlns:a14="http://schemas.microsoft.com/office/drawing/2010/main" val="0"/>
+              </a:ext>
+              <a:ext uri="{96DAC541-7B7A-43D3-8B79-37D633B846F1}">
+                <asvg:svgBlip xmlns:asvg="http://schemas.microsoft.com/office/drawing/2016/SVG/main" r:embed="rId17"/>
+              </a:ext>
+            </a:extLst>
+          </a:blip>
+          <a:stretch>
+            <a:fillRect/>
+          </a:stretch>
+        </p:blipFill>
+        <p:spPr>
+          <a:xfrm>
+            <a:off x="29454099" y="21941952"/>
+            <a:ext cx="2411447" cy="2411447"/>
+          </a:xfrm>
+          <a:prstGeom prst="rect">
+            <a:avLst/>
+          </a:prstGeom>
+        </p:spPr>
+      </p:pic>
+      <p:sp>
+        <p:nvSpPr>
+          <p:cNvPr id="92" name="TextBox 91">
+            <a:extLst>
+              <a:ext uri="{FF2B5EF4-FFF2-40B4-BE49-F238E27FC236}">
+                <a16:creationId xmlns:a16="http://schemas.microsoft.com/office/drawing/2014/main" id="{4117A23F-2D82-C243-AEAD-6A5FA780D8AA}"/>
+              </a:ext>
+            </a:extLst>
+          </p:cNvPr>
+          <p:cNvSpPr txBox="1"/>
+          <p:nvPr/>
+        </p:nvSpPr>
+        <p:spPr>
+          <a:xfrm>
+            <a:off x="29636414" y="21110956"/>
+            <a:ext cx="2061408" cy="830997"/>
+          </a:xfrm>
+          <a:prstGeom prst="rect">
+            <a:avLst/>
+          </a:prstGeom>
+          <a:noFill/>
+        </p:spPr>
+        <p:txBody>
+          <a:bodyPr wrap="square" rtlCol="0">
+            <a:spAutoFit/>
+          </a:bodyPr>
+          <a:lstStyle/>
+          <a:p>
+            <a:r>
+              <a:rPr lang="en-US" sz="2400" dirty="0"/>
+              <a:t>Use the BIDS Validator</a:t>
+            </a:r>
+          </a:p>
+        </p:txBody>
+      </p:sp>
+      <p:sp>
+        <p:nvSpPr>
+          <p:cNvPr id="94" name="Rectangle 93">
+            <a:extLst>
+              <a:ext uri="{FF2B5EF4-FFF2-40B4-BE49-F238E27FC236}">
+                <a16:creationId xmlns:a16="http://schemas.microsoft.com/office/drawing/2014/main" id="{B5B8D742-FAA6-6149-BCC4-19C4F31AE628}"/>
+              </a:ext>
+            </a:extLst>
+          </p:cNvPr>
+          <p:cNvSpPr>
+            <a:spLocks noChangeArrowheads="1"/>
+          </p:cNvSpPr>
+          <p:nvPr/>
+        </p:nvSpPr>
+        <p:spPr bwMode="auto">
+          <a:xfrm>
+            <a:off x="762000" y="19676047"/>
+            <a:ext cx="20796332" cy="1126553"/>
+          </a:xfrm>
+          <a:prstGeom prst="rect">
+            <a:avLst/>
+          </a:prstGeom>
+          <a:solidFill>
+            <a:schemeClr val="accent5"/>
+          </a:solidFill>
+          <a:ln w="12700">
+            <a:noFill/>
+            <a:miter lim="800000"/>
+          </a:ln>
+        </p:spPr>
+        <p:txBody>
+          <a:bodyPr wrap="none" lIns="274320" tIns="73152" rIns="274320" bIns="68563" anchor="ctr" anchorCtr="0"/>
+          <a:lstStyle>
+            <a:defPPr>
+              <a:defRPr lang="en-US"/>
+            </a:defPPr>
+            <a:lvl1pPr algn="l" rtl="0" eaLnBrk="0" fontAlgn="base" hangingPunct="0">
+              <a:spcBef>
+                <a:spcPct val="0"/>
+              </a:spcBef>
+              <a:spcAft>
+                <a:spcPct val="0"/>
+              </a:spcAft>
+              <a:defRPr sz="2400" kern="1200">
+                <a:solidFill>
+                  <a:schemeClr val="tx1"/>
+                </a:solidFill>
+                <a:effectLst>
+                  <a:outerShdw blurRad="38100" dist="38100" dir="2700000" algn="tl">
+                    <a:srgbClr val="000000">
+                      <a:alpha val="43137"/>
+                    </a:srgbClr>
+                  </a:outerShdw>
+                </a:effectLst>
+                <a:latin typeface="Times New Roman" pitchFamily="18" charset="0"/>
+                <a:ea typeface="+mn-ea"/>
+                <a:cs typeface="+mn-cs"/>
+              </a:defRPr>
+            </a:lvl1pPr>
+            <a:lvl2pPr marL="457200" algn="l" rtl="0" eaLnBrk="0" fontAlgn="base" hangingPunct="0">
+              <a:spcBef>
+                <a:spcPct val="0"/>
+              </a:spcBef>
+              <a:spcAft>
+                <a:spcPct val="0"/>
+              </a:spcAft>
+              <a:defRPr sz="2400" kern="1200">
+                <a:solidFill>
+                  <a:schemeClr val="tx1"/>
+                </a:solidFill>
+                <a:effectLst>
+                  <a:outerShdw blurRad="38100" dist="38100" dir="2700000" algn="tl">
+                    <a:srgbClr val="000000">
+                      <a:alpha val="43137"/>
+                    </a:srgbClr>
+                  </a:outerShdw>
+                </a:effectLst>
+                <a:latin typeface="Times New Roman" pitchFamily="18" charset="0"/>
+                <a:ea typeface="+mn-ea"/>
+                <a:cs typeface="+mn-cs"/>
+              </a:defRPr>
+            </a:lvl2pPr>
+            <a:lvl3pPr marL="914400" algn="l" rtl="0" eaLnBrk="0" fontAlgn="base" hangingPunct="0">
+              <a:spcBef>
+                <a:spcPct val="0"/>
+              </a:spcBef>
+              <a:spcAft>
+                <a:spcPct val="0"/>
+              </a:spcAft>
+              <a:defRPr sz="2400" kern="1200">
+                <a:solidFill>
+                  <a:schemeClr val="tx1"/>
+                </a:solidFill>
+                <a:effectLst>
+                  <a:outerShdw blurRad="38100" dist="38100" dir="2700000" algn="tl">
+                    <a:srgbClr val="000000">
+                      <a:alpha val="43137"/>
+                    </a:srgbClr>
+                  </a:outerShdw>
+                </a:effectLst>
+                <a:latin typeface="Times New Roman" pitchFamily="18" charset="0"/>
+                <a:ea typeface="+mn-ea"/>
+                <a:cs typeface="+mn-cs"/>
+              </a:defRPr>
+            </a:lvl3pPr>
+            <a:lvl4pPr marL="1371600" algn="l" rtl="0" eaLnBrk="0" fontAlgn="base" hangingPunct="0">
+              <a:spcBef>
+                <a:spcPct val="0"/>
+              </a:spcBef>
+              <a:spcAft>
+                <a:spcPct val="0"/>
+              </a:spcAft>
+              <a:defRPr sz="2400" kern="1200">
+                <a:solidFill>
+                  <a:schemeClr val="tx1"/>
+                </a:solidFill>
+                <a:effectLst>
+                  <a:outerShdw blurRad="38100" dist="38100" dir="2700000" algn="tl">
+                    <a:srgbClr val="000000">
+                      <a:alpha val="43137"/>
+                    </a:srgbClr>
+                  </a:outerShdw>
+                </a:effectLst>
+                <a:latin typeface="Times New Roman" pitchFamily="18" charset="0"/>
+                <a:ea typeface="+mn-ea"/>
+                <a:cs typeface="+mn-cs"/>
+              </a:defRPr>
+            </a:lvl4pPr>
+            <a:lvl5pPr marL="1828800" algn="l" rtl="0" eaLnBrk="0" fontAlgn="base" hangingPunct="0">
+              <a:spcBef>
+                <a:spcPct val="0"/>
+              </a:spcBef>
+              <a:spcAft>
+                <a:spcPct val="0"/>
+              </a:spcAft>
+              <a:defRPr sz="2400" kern="1200">
+                <a:solidFill>
+                  <a:schemeClr val="tx1"/>
+                </a:solidFill>
+                <a:effectLst>
+                  <a:outerShdw blurRad="38100" dist="38100" dir="2700000" algn="tl">
+                    <a:srgbClr val="000000">
+                      <a:alpha val="43137"/>
+                    </a:srgbClr>
+                  </a:outerShdw>
+                </a:effectLst>
+                <a:latin typeface="Times New Roman" pitchFamily="18" charset="0"/>
+                <a:ea typeface="+mn-ea"/>
+                <a:cs typeface="+mn-cs"/>
+              </a:defRPr>
+            </a:lvl5pPr>
+            <a:lvl6pPr marL="2286000" algn="l" defTabSz="914400" rtl="0" eaLnBrk="1" latinLnBrk="0" hangingPunct="1">
+              <a:defRPr sz="2400" kern="1200">
+                <a:solidFill>
+                  <a:schemeClr val="tx1"/>
+                </a:solidFill>
+                <a:effectLst>
+                  <a:outerShdw blurRad="38100" dist="38100" dir="2700000" algn="tl">
+                    <a:srgbClr val="000000">
+                      <a:alpha val="43137"/>
+                    </a:srgbClr>
+                  </a:outerShdw>
+                </a:effectLst>
+                <a:latin typeface="Times New Roman" pitchFamily="18" charset="0"/>
+                <a:ea typeface="+mn-ea"/>
+                <a:cs typeface="+mn-cs"/>
+              </a:defRPr>
+            </a:lvl6pPr>
+            <a:lvl7pPr marL="2743200" algn="l" defTabSz="914400" rtl="0" eaLnBrk="1" latinLnBrk="0" hangingPunct="1">
+              <a:defRPr sz="2400" kern="1200">
+                <a:solidFill>
+                  <a:schemeClr val="tx1"/>
+                </a:solidFill>
+                <a:effectLst>
+                  <a:outerShdw blurRad="38100" dist="38100" dir="2700000" algn="tl">
+                    <a:srgbClr val="000000">
+                      <a:alpha val="43137"/>
+                    </a:srgbClr>
+                  </a:outerShdw>
+                </a:effectLst>
+                <a:latin typeface="Times New Roman" pitchFamily="18" charset="0"/>
+                <a:ea typeface="+mn-ea"/>
+                <a:cs typeface="+mn-cs"/>
+              </a:defRPr>
+            </a:lvl7pPr>
+            <a:lvl8pPr marL="3200400" algn="l" defTabSz="914400" rtl="0" eaLnBrk="1" latinLnBrk="0" hangingPunct="1">
+              <a:defRPr sz="2400" kern="1200">
+                <a:solidFill>
+                  <a:schemeClr val="tx1"/>
+                </a:solidFill>
+                <a:effectLst>
+                  <a:outerShdw blurRad="38100" dist="38100" dir="2700000" algn="tl">
+                    <a:srgbClr val="000000">
+                      <a:alpha val="43137"/>
+                    </a:srgbClr>
+                  </a:outerShdw>
+                </a:effectLst>
+                <a:latin typeface="Times New Roman" pitchFamily="18" charset="0"/>
+                <a:ea typeface="+mn-ea"/>
+                <a:cs typeface="+mn-cs"/>
+              </a:defRPr>
+            </a:lvl8pPr>
+            <a:lvl9pPr marL="3657600" algn="l" defTabSz="914400" rtl="0" eaLnBrk="1" latinLnBrk="0" hangingPunct="1">
+              <a:defRPr sz="2400" kern="1200">
+                <a:solidFill>
+                  <a:schemeClr val="tx1"/>
+                </a:solidFill>
+                <a:effectLst>
+                  <a:outerShdw blurRad="38100" dist="38100" dir="2700000" algn="tl">
+                    <a:srgbClr val="000000">
+                      <a:alpha val="43137"/>
+                    </a:srgbClr>
+                  </a:outerShdw>
+                </a:effectLst>
+                <a:latin typeface="Times New Roman" pitchFamily="18" charset="0"/>
+                <a:ea typeface="+mn-ea"/>
+                <a:cs typeface="+mn-cs"/>
+              </a:defRPr>
+            </a:lvl9pPr>
+          </a:lstStyle>
+          <a:p>
+            <a:pPr defTabSz="4702588">
+              <a:defRPr/>
+            </a:pPr>
+            <a:r>
+              <a:rPr lang="en-US" sz="4200" dirty="0">
+                <a:solidFill>
+                  <a:schemeClr val="bg1"/>
+                </a:solidFill>
+                <a:effectLst/>
+                <a:latin typeface="Amaranth" panose="02000503050000020004" pitchFamily="2" charset="0"/>
+              </a:rPr>
+              <a:t>Current Work</a:t>
+            </a:r>
+          </a:p>
+        </p:txBody>
+      </p:sp>
+      <p:sp>
+        <p:nvSpPr>
+          <p:cNvPr id="95" name="Text Box 6">
+            <a:extLst>
+              <a:ext uri="{FF2B5EF4-FFF2-40B4-BE49-F238E27FC236}">
+                <a16:creationId xmlns:a16="http://schemas.microsoft.com/office/drawing/2014/main" id="{465DEEED-A999-EF40-B640-96B92B1EC30B}"/>
+              </a:ext>
+            </a:extLst>
+          </p:cNvPr>
+          <p:cNvSpPr txBox="1">
+            <a:spLocks noChangeArrowheads="1"/>
+          </p:cNvSpPr>
+          <p:nvPr/>
+        </p:nvSpPr>
+        <p:spPr bwMode="auto">
+          <a:xfrm>
+            <a:off x="1025566" y="21078471"/>
+            <a:ext cx="20269199" cy="2908489"/>
+          </a:xfrm>
+          <a:prstGeom prst="rect">
+            <a:avLst/>
+          </a:prstGeom>
+          <a:noFill/>
+          <a:ln>
+            <a:noFill/>
+          </a:ln>
+          <a:extLst>
+            <a:ext uri="{909E8E84-426E-40DD-AFC4-6F175D3DCCD1}">
+              <a14:hiddenFill xmlns:a14="http://schemas.microsoft.com/office/drawing/2010/main">
+                <a:solidFill>
+                  <a:schemeClr val="accent1"/>
+                </a:solidFill>
+              </a14:hiddenFill>
+            </a:ext>
+            <a:ext uri="{91240B29-F687-4F45-9708-019B960494DF}">
+              <a14:hiddenLine xmlns:a14="http://schemas.microsoft.com/office/drawing/2010/main" w="9525">
+                <a:solidFill>
+                  <a:schemeClr val="tx1"/>
+                </a:solidFill>
+                <a:miter lim="800000"/>
+                <a:headEnd/>
+                <a:tailEnd/>
+              </a14:hiddenLine>
+            </a:ext>
+            <a:ext uri="{AF507438-7753-43E0-B8FC-AC1667EBCBE1}">
+              <a14:hiddenEffects xmlns:a14="http://schemas.microsoft.com/office/drawing/2010/main">
+                <a:effectLst>
+                  <a:outerShdw dist="35921" dir="2700000" algn="ctr" rotWithShape="0">
+                    <a:schemeClr val="bg2"/>
+                  </a:outerShdw>
+                </a:effectLst>
+              </a14:hiddenEffects>
+            </a:ext>
+          </a:extLst>
+        </p:spPr>
+        <p:txBody>
+          <a:bodyPr wrap="square" lIns="137160" tIns="68580" rIns="137160" bIns="68580">
+            <a:spAutoFit/>
+          </a:bodyPr>
+          <a:lstStyle>
+            <a:defPPr>
+              <a:defRPr kern="1200" smtId="4294967295"/>
+            </a:defPPr>
+            <a:lvl1pPr defTabSz="4703763" eaLnBrk="0" hangingPunct="0">
+              <a:defRPr sz="9300">
+                <a:solidFill>
+                  <a:schemeClr val="tx1"/>
+                </a:solidFill>
+                <a:latin typeface="Arial"/>
+              </a:defRPr>
+            </a:lvl1pPr>
+            <a:lvl2pPr marL="742950" indent="-285750" defTabSz="4703763" eaLnBrk="0" hangingPunct="0">
+              <a:defRPr sz="9300">
+                <a:solidFill>
+                  <a:schemeClr val="tx1"/>
+                </a:solidFill>
+                <a:latin typeface="Arial"/>
+              </a:defRPr>
+            </a:lvl2pPr>
+            <a:lvl3pPr marL="1143000" indent="-228600" defTabSz="4703763" eaLnBrk="0" hangingPunct="0">
+              <a:defRPr sz="9300">
+                <a:solidFill>
+                  <a:schemeClr val="tx1"/>
+                </a:solidFill>
+                <a:latin typeface="Arial"/>
+              </a:defRPr>
+            </a:lvl3pPr>
+            <a:lvl4pPr marL="1600200" indent="-228600" defTabSz="4703763" eaLnBrk="0" hangingPunct="0">
+              <a:defRPr sz="9300">
+                <a:solidFill>
+                  <a:schemeClr val="tx1"/>
+                </a:solidFill>
+                <a:latin typeface="Arial"/>
+              </a:defRPr>
+            </a:lvl4pPr>
+            <a:lvl5pPr marL="2057400" indent="-228600" defTabSz="4703763" eaLnBrk="0" hangingPunct="0">
+              <a:defRPr sz="9300">
+                <a:solidFill>
+                  <a:schemeClr val="tx1"/>
+                </a:solidFill>
+                <a:latin typeface="Arial"/>
+              </a:defRPr>
+            </a:lvl5pPr>
+            <a:lvl6pPr marL="2514600" indent="-228600" defTabSz="4703763" eaLnBrk="0" fontAlgn="base" hangingPunct="0">
+              <a:spcBef>
+                <a:spcPct val="0"/>
+              </a:spcBef>
+              <a:spcAft>
+                <a:spcPct val="0"/>
+              </a:spcAft>
+              <a:defRPr sz="9300">
+                <a:solidFill>
+                  <a:schemeClr val="tx1"/>
+                </a:solidFill>
+                <a:latin typeface="Arial"/>
+              </a:defRPr>
+            </a:lvl6pPr>
+            <a:lvl7pPr marL="2971800" indent="-228600" defTabSz="4703763" eaLnBrk="0" fontAlgn="base" hangingPunct="0">
+              <a:spcBef>
+                <a:spcPct val="0"/>
+              </a:spcBef>
+              <a:spcAft>
+                <a:spcPct val="0"/>
+              </a:spcAft>
+              <a:defRPr sz="9300">
+                <a:solidFill>
+                  <a:schemeClr val="tx1"/>
+                </a:solidFill>
+                <a:latin typeface="Arial"/>
+              </a:defRPr>
+            </a:lvl7pPr>
+            <a:lvl8pPr marL="3429000" indent="-228600" defTabSz="4703763" eaLnBrk="0" fontAlgn="base" hangingPunct="0">
+              <a:spcBef>
+                <a:spcPct val="0"/>
+              </a:spcBef>
+              <a:spcAft>
+                <a:spcPct val="0"/>
+              </a:spcAft>
+              <a:defRPr sz="9300">
+                <a:solidFill>
+                  <a:schemeClr val="tx1"/>
+                </a:solidFill>
+                <a:latin typeface="Arial"/>
+              </a:defRPr>
+            </a:lvl8pPr>
+            <a:lvl9pPr marL="3886200" indent="-228600" defTabSz="4703763" eaLnBrk="0" fontAlgn="base" hangingPunct="0">
+              <a:spcBef>
+                <a:spcPct val="0"/>
+              </a:spcBef>
+              <a:spcAft>
+                <a:spcPct val="0"/>
+              </a:spcAft>
+              <a:defRPr sz="9300">
+                <a:solidFill>
+                  <a:schemeClr val="tx1"/>
+                </a:solidFill>
+                <a:latin typeface="Arial"/>
+              </a:defRPr>
+            </a:lvl9pPr>
+          </a:lstStyle>
+          <a:p>
+            <a:r>
+              <a:rPr lang="en-US" sz="3600" dirty="0">
+                <a:latin typeface="Titillium Web" panose="00000500000000000000" pitchFamily="2" charset="0"/>
+                <a:ea typeface="Open Sans" panose="020B0606030504020204" pitchFamily="34" charset="0"/>
+                <a:cs typeface="Open Sans" panose="020B0606030504020204" pitchFamily="34" charset="0"/>
+              </a:rPr>
+              <a:t>Specifically, OpenNeuroPET is working on developing software to support the PET BIDS standard as well as continuing to extend BIDS to support PET pre-processing derivatives.</a:t>
+            </a:r>
+          </a:p>
+          <a:p>
+            <a:endParaRPr lang="en-US" sz="3600" dirty="0">
+              <a:latin typeface="Titillium Web" panose="00000500000000000000" pitchFamily="2" charset="0"/>
+              <a:ea typeface="Open Sans" panose="020B0606030504020204" pitchFamily="34" charset="0"/>
+              <a:cs typeface="Open Sans" panose="020B0606030504020204" pitchFamily="34" charset="0"/>
+            </a:endParaRPr>
+          </a:p>
+          <a:p>
+            <a:r>
+              <a:rPr lang="en-US" sz="3600" dirty="0">
+                <a:latin typeface="Titillium Web" panose="00000500000000000000" pitchFamily="2" charset="0"/>
+                <a:ea typeface="Open Sans" panose="020B0606030504020204" pitchFamily="34" charset="0"/>
+                <a:cs typeface="Open Sans" panose="020B0606030504020204" pitchFamily="34" charset="0"/>
+              </a:rPr>
+              <a:t>OpenNeuroPET is building out the infrastructure to support:</a:t>
+            </a:r>
+          </a:p>
+          <a:p>
+            <a:endParaRPr lang="en-US" sz="3600" dirty="0">
+              <a:latin typeface="Titillium Web" panose="00000500000000000000" pitchFamily="2" charset="0"/>
+              <a:ea typeface="Open Sans" panose="020B0606030504020204" pitchFamily="34" charset="0"/>
+              <a:cs typeface="Open Sans" panose="020B0606030504020204" pitchFamily="34" charset="0"/>
+            </a:endParaRPr>
+          </a:p>
+        </p:txBody>
+      </p:sp>
+      <p:sp>
+        <p:nvSpPr>
+          <p:cNvPr id="97" name="TextBox 96">
+            <a:extLst>
+              <a:ext uri="{FF2B5EF4-FFF2-40B4-BE49-F238E27FC236}">
+                <a16:creationId xmlns:a16="http://schemas.microsoft.com/office/drawing/2014/main" id="{465EADF4-5675-1849-B44A-B91285E40F4D}"/>
+              </a:ext>
+            </a:extLst>
+          </p:cNvPr>
+          <p:cNvSpPr txBox="1"/>
+          <p:nvPr/>
+        </p:nvSpPr>
+        <p:spPr>
+          <a:xfrm>
+            <a:off x="1115791" y="23563039"/>
+            <a:ext cx="10830418" cy="2677656"/>
+          </a:xfrm>
+          <a:prstGeom prst="rect">
+            <a:avLst/>
+          </a:prstGeom>
+          <a:noFill/>
+        </p:spPr>
+        <p:txBody>
+          <a:bodyPr wrap="square" rtlCol="0">
+            <a:spAutoFit/>
+          </a:bodyPr>
+          <a:lstStyle/>
+          <a:p>
+            <a:pPr marL="342900" indent="-342900">
+              <a:buFontTx/>
+              <a:buChar char="-"/>
+            </a:pPr>
+            <a:r>
+              <a:rPr lang="en-US" sz="2400" dirty="0"/>
+              <a:t>Conversion of reconstructed PET data and metadata into BIDS</a:t>
+            </a:r>
+          </a:p>
+          <a:p>
+            <a:pPr marL="342900" indent="-342900">
+              <a:buFontTx/>
+              <a:buChar char="-"/>
+            </a:pPr>
+            <a:r>
+              <a:rPr lang="en-US" sz="2400" dirty="0"/>
+              <a:t>Creating CC0 and GDPR-DUA upload portals for OpenNeuro.org</a:t>
+            </a:r>
+          </a:p>
+          <a:p>
+            <a:pPr marL="342900" indent="-342900">
+              <a:buFontTx/>
+              <a:buChar char="-"/>
+            </a:pPr>
+            <a:r>
+              <a:rPr lang="en-US" sz="2400" dirty="0"/>
+              <a:t>Converting datasets at the Neurobiology Research Unit at Copenhagen University and the NIMH</a:t>
+            </a:r>
+          </a:p>
+          <a:p>
+            <a:pPr marL="342900" indent="-342900">
+              <a:buFontTx/>
+              <a:buChar char="-"/>
+            </a:pPr>
+            <a:r>
+              <a:rPr lang="en-US" sz="2400" dirty="0"/>
+              <a:t>Reaching out to senior PET experts while extending BIDS further with BIDS extension proposal 023 to include pre-processing derivatives</a:t>
+            </a:r>
+          </a:p>
+          <a:p>
+            <a:pPr marL="342900" indent="-342900">
+              <a:buFontTx/>
+              <a:buChar char="-"/>
+            </a:pPr>
+            <a:r>
+              <a:rPr lang="en-US" sz="2400" dirty="0"/>
+              <a:t>Working with popular neuroimaging tool makers to better support PET </a:t>
+            </a:r>
+          </a:p>
+        </p:txBody>
+      </p:sp>
+      <p:sp>
+        <p:nvSpPr>
+          <p:cNvPr id="99" name="Text Box 6">
+            <a:extLst>
+              <a:ext uri="{FF2B5EF4-FFF2-40B4-BE49-F238E27FC236}">
+                <a16:creationId xmlns:a16="http://schemas.microsoft.com/office/drawing/2014/main" id="{3305447F-6B98-0447-AC10-00044499AA7E}"/>
+              </a:ext>
+            </a:extLst>
+          </p:cNvPr>
+          <p:cNvSpPr txBox="1">
+            <a:spLocks noChangeArrowheads="1"/>
+          </p:cNvSpPr>
+          <p:nvPr/>
+        </p:nvSpPr>
+        <p:spPr bwMode="auto">
+          <a:xfrm>
+            <a:off x="1025566" y="26795105"/>
+            <a:ext cx="12031220" cy="1246495"/>
+          </a:xfrm>
+          <a:prstGeom prst="rect">
+            <a:avLst/>
+          </a:prstGeom>
+          <a:noFill/>
+          <a:ln>
+            <a:noFill/>
+          </a:ln>
+          <a:extLst>
+            <a:ext uri="{909E8E84-426E-40DD-AFC4-6F175D3DCCD1}">
+              <a14:hiddenFill xmlns:a14="http://schemas.microsoft.com/office/drawing/2010/main">
+                <a:solidFill>
+                  <a:schemeClr val="accent1"/>
+                </a:solidFill>
+              </a14:hiddenFill>
+            </a:ext>
+            <a:ext uri="{91240B29-F687-4F45-9708-019B960494DF}">
+              <a14:hiddenLine xmlns:a14="http://schemas.microsoft.com/office/drawing/2010/main" w="9525">
+                <a:solidFill>
+                  <a:schemeClr val="tx1"/>
+                </a:solidFill>
+                <a:miter lim="800000"/>
+                <a:headEnd/>
+                <a:tailEnd/>
+              </a14:hiddenLine>
+            </a:ext>
+            <a:ext uri="{AF507438-7753-43E0-B8FC-AC1667EBCBE1}">
+              <a14:hiddenEffects xmlns:a14="http://schemas.microsoft.com/office/drawing/2010/main">
+                <a:effectLst>
+                  <a:outerShdw dist="35921" dir="2700000" algn="ctr" rotWithShape="0">
+                    <a:schemeClr val="bg2"/>
+                  </a:outerShdw>
+                </a:effectLst>
+              </a14:hiddenEffects>
+            </a:ext>
+          </a:extLst>
+        </p:spPr>
+        <p:txBody>
+          <a:bodyPr wrap="square" lIns="137160" tIns="68580" rIns="137160" bIns="68580">
+            <a:spAutoFit/>
+          </a:bodyPr>
+          <a:lstStyle>
+            <a:defPPr>
+              <a:defRPr kern="1200" smtId="4294967295"/>
+            </a:defPPr>
+            <a:lvl1pPr defTabSz="4703763" eaLnBrk="0" hangingPunct="0">
+              <a:defRPr sz="9300">
+                <a:solidFill>
+                  <a:schemeClr val="tx1"/>
+                </a:solidFill>
+                <a:latin typeface="Arial"/>
+              </a:defRPr>
+            </a:lvl1pPr>
+            <a:lvl2pPr marL="742950" indent="-285750" defTabSz="4703763" eaLnBrk="0" hangingPunct="0">
+              <a:defRPr sz="9300">
+                <a:solidFill>
+                  <a:schemeClr val="tx1"/>
+                </a:solidFill>
+                <a:latin typeface="Arial"/>
+              </a:defRPr>
+            </a:lvl2pPr>
+            <a:lvl3pPr marL="1143000" indent="-228600" defTabSz="4703763" eaLnBrk="0" hangingPunct="0">
+              <a:defRPr sz="9300">
+                <a:solidFill>
+                  <a:schemeClr val="tx1"/>
+                </a:solidFill>
+                <a:latin typeface="Arial"/>
+              </a:defRPr>
+            </a:lvl3pPr>
+            <a:lvl4pPr marL="1600200" indent="-228600" defTabSz="4703763" eaLnBrk="0" hangingPunct="0">
+              <a:defRPr sz="9300">
+                <a:solidFill>
+                  <a:schemeClr val="tx1"/>
+                </a:solidFill>
+                <a:latin typeface="Arial"/>
+              </a:defRPr>
+            </a:lvl4pPr>
+            <a:lvl5pPr marL="2057400" indent="-228600" defTabSz="4703763" eaLnBrk="0" hangingPunct="0">
+              <a:defRPr sz="9300">
+                <a:solidFill>
+                  <a:schemeClr val="tx1"/>
+                </a:solidFill>
+                <a:latin typeface="Arial"/>
+              </a:defRPr>
+            </a:lvl5pPr>
+            <a:lvl6pPr marL="2514600" indent="-228600" defTabSz="4703763" eaLnBrk="0" fontAlgn="base" hangingPunct="0">
+              <a:spcBef>
+                <a:spcPct val="0"/>
+              </a:spcBef>
+              <a:spcAft>
+                <a:spcPct val="0"/>
+              </a:spcAft>
+              <a:defRPr sz="9300">
+                <a:solidFill>
+                  <a:schemeClr val="tx1"/>
+                </a:solidFill>
+                <a:latin typeface="Arial"/>
+              </a:defRPr>
+            </a:lvl6pPr>
+            <a:lvl7pPr marL="2971800" indent="-228600" defTabSz="4703763" eaLnBrk="0" fontAlgn="base" hangingPunct="0">
+              <a:spcBef>
+                <a:spcPct val="0"/>
+              </a:spcBef>
+              <a:spcAft>
+                <a:spcPct val="0"/>
+              </a:spcAft>
+              <a:defRPr sz="9300">
+                <a:solidFill>
+                  <a:schemeClr val="tx1"/>
+                </a:solidFill>
+                <a:latin typeface="Arial"/>
+              </a:defRPr>
+            </a:lvl7pPr>
+            <a:lvl8pPr marL="3429000" indent="-228600" defTabSz="4703763" eaLnBrk="0" fontAlgn="base" hangingPunct="0">
+              <a:spcBef>
+                <a:spcPct val="0"/>
+              </a:spcBef>
+              <a:spcAft>
+                <a:spcPct val="0"/>
+              </a:spcAft>
+              <a:defRPr sz="9300">
+                <a:solidFill>
+                  <a:schemeClr val="tx1"/>
+                </a:solidFill>
+                <a:latin typeface="Arial"/>
+              </a:defRPr>
+            </a:lvl8pPr>
+            <a:lvl9pPr marL="3886200" indent="-228600" defTabSz="4703763" eaLnBrk="0" fontAlgn="base" hangingPunct="0">
+              <a:spcBef>
+                <a:spcPct val="0"/>
+              </a:spcBef>
+              <a:spcAft>
+                <a:spcPct val="0"/>
+              </a:spcAft>
+              <a:defRPr sz="9300">
+                <a:solidFill>
+                  <a:schemeClr val="tx1"/>
+                </a:solidFill>
+                <a:latin typeface="Arial"/>
+              </a:defRPr>
+            </a:lvl9pPr>
+          </a:lstStyle>
+          <a:p>
+            <a:r>
+              <a:rPr lang="en-US" sz="3600" dirty="0">
+                <a:latin typeface="Titillium Web" panose="00000500000000000000" pitchFamily="2" charset="0"/>
+                <a:ea typeface="Open Sans" panose="020B0606030504020204" pitchFamily="34" charset="0"/>
+                <a:cs typeface="Open Sans" panose="020B0606030504020204" pitchFamily="34" charset="0"/>
+              </a:rPr>
+              <a:t>To contact OpenNeuroPET or to find out more about its work follow the link to the right.</a:t>
+            </a:r>
+          </a:p>
+        </p:txBody>
+      </p:sp>
+      <p:sp>
+        <p:nvSpPr>
+          <p:cNvPr id="100" name="Text Box 6">
+            <a:extLst>
+              <a:ext uri="{FF2B5EF4-FFF2-40B4-BE49-F238E27FC236}">
+                <a16:creationId xmlns:a16="http://schemas.microsoft.com/office/drawing/2014/main" id="{B28020D7-9A59-5744-B937-EFE5D4D96EF7}"/>
+              </a:ext>
+            </a:extLst>
+          </p:cNvPr>
+          <p:cNvSpPr txBox="1">
+            <a:spLocks noChangeArrowheads="1"/>
+          </p:cNvSpPr>
+          <p:nvPr/>
+        </p:nvSpPr>
+        <p:spPr bwMode="auto">
+          <a:xfrm>
+            <a:off x="14619393" y="27332942"/>
+            <a:ext cx="6542560" cy="692497"/>
+          </a:xfrm>
+          <a:prstGeom prst="rect">
+            <a:avLst/>
+          </a:prstGeom>
+          <a:noFill/>
+          <a:ln>
+            <a:noFill/>
+          </a:ln>
+          <a:extLst>
+            <a:ext uri="{909E8E84-426E-40DD-AFC4-6F175D3DCCD1}">
+              <a14:hiddenFill xmlns:a14="http://schemas.microsoft.com/office/drawing/2010/main">
+                <a:solidFill>
+                  <a:schemeClr val="accent1"/>
+                </a:solidFill>
+              </a14:hiddenFill>
+            </a:ext>
+            <a:ext uri="{91240B29-F687-4F45-9708-019B960494DF}">
+              <a14:hiddenLine xmlns:a14="http://schemas.microsoft.com/office/drawing/2010/main" w="9525">
+                <a:solidFill>
+                  <a:schemeClr val="tx1"/>
+                </a:solidFill>
+                <a:miter lim="800000"/>
+                <a:headEnd/>
+                <a:tailEnd/>
+              </a14:hiddenLine>
+            </a:ext>
+            <a:ext uri="{AF507438-7753-43E0-B8FC-AC1667EBCBE1}">
+              <a14:hiddenEffects xmlns:a14="http://schemas.microsoft.com/office/drawing/2010/main">
+                <a:effectLst>
+                  <a:outerShdw dist="35921" dir="2700000" algn="ctr" rotWithShape="0">
+                    <a:schemeClr val="bg2"/>
+                  </a:outerShdw>
+                </a:effectLst>
+              </a14:hiddenEffects>
+            </a:ext>
+          </a:extLst>
+        </p:spPr>
+        <p:txBody>
+          <a:bodyPr wrap="square" lIns="137160" tIns="68580" rIns="137160" bIns="68580">
+            <a:spAutoFit/>
+          </a:bodyPr>
+          <a:lstStyle>
+            <a:defPPr>
+              <a:defRPr kern="1200" smtId="4294967295"/>
+            </a:defPPr>
+            <a:lvl1pPr defTabSz="4703763" eaLnBrk="0" hangingPunct="0">
+              <a:defRPr sz="9300">
+                <a:solidFill>
+                  <a:schemeClr val="tx1"/>
+                </a:solidFill>
+                <a:latin typeface="Arial"/>
+              </a:defRPr>
+            </a:lvl1pPr>
+            <a:lvl2pPr marL="742950" indent="-285750" defTabSz="4703763" eaLnBrk="0" hangingPunct="0">
+              <a:defRPr sz="9300">
+                <a:solidFill>
+                  <a:schemeClr val="tx1"/>
+                </a:solidFill>
+                <a:latin typeface="Arial"/>
+              </a:defRPr>
+            </a:lvl2pPr>
+            <a:lvl3pPr marL="1143000" indent="-228600" defTabSz="4703763" eaLnBrk="0" hangingPunct="0">
+              <a:defRPr sz="9300">
+                <a:solidFill>
+                  <a:schemeClr val="tx1"/>
+                </a:solidFill>
+                <a:latin typeface="Arial"/>
+              </a:defRPr>
+            </a:lvl3pPr>
+            <a:lvl4pPr marL="1600200" indent="-228600" defTabSz="4703763" eaLnBrk="0" hangingPunct="0">
+              <a:defRPr sz="9300">
+                <a:solidFill>
+                  <a:schemeClr val="tx1"/>
+                </a:solidFill>
+                <a:latin typeface="Arial"/>
+              </a:defRPr>
+            </a:lvl4pPr>
+            <a:lvl5pPr marL="2057400" indent="-228600" defTabSz="4703763" eaLnBrk="0" hangingPunct="0">
+              <a:defRPr sz="9300">
+                <a:solidFill>
+                  <a:schemeClr val="tx1"/>
+                </a:solidFill>
+                <a:latin typeface="Arial"/>
+              </a:defRPr>
+            </a:lvl5pPr>
+            <a:lvl6pPr marL="2514600" indent="-228600" defTabSz="4703763" eaLnBrk="0" fontAlgn="base" hangingPunct="0">
+              <a:spcBef>
+                <a:spcPct val="0"/>
+              </a:spcBef>
+              <a:spcAft>
+                <a:spcPct val="0"/>
+              </a:spcAft>
+              <a:defRPr sz="9300">
+                <a:solidFill>
+                  <a:schemeClr val="tx1"/>
+                </a:solidFill>
+                <a:latin typeface="Arial"/>
+              </a:defRPr>
+            </a:lvl6pPr>
+            <a:lvl7pPr marL="2971800" indent="-228600" defTabSz="4703763" eaLnBrk="0" fontAlgn="base" hangingPunct="0">
+              <a:spcBef>
+                <a:spcPct val="0"/>
+              </a:spcBef>
+              <a:spcAft>
+                <a:spcPct val="0"/>
+              </a:spcAft>
+              <a:defRPr sz="9300">
+                <a:solidFill>
+                  <a:schemeClr val="tx1"/>
+                </a:solidFill>
+                <a:latin typeface="Arial"/>
+              </a:defRPr>
+            </a:lvl7pPr>
+            <a:lvl8pPr marL="3429000" indent="-228600" defTabSz="4703763" eaLnBrk="0" fontAlgn="base" hangingPunct="0">
+              <a:spcBef>
+                <a:spcPct val="0"/>
+              </a:spcBef>
+              <a:spcAft>
+                <a:spcPct val="0"/>
+              </a:spcAft>
+              <a:defRPr sz="9300">
+                <a:solidFill>
+                  <a:schemeClr val="tx1"/>
+                </a:solidFill>
+                <a:latin typeface="Arial"/>
+              </a:defRPr>
+            </a:lvl8pPr>
+            <a:lvl9pPr marL="3886200" indent="-228600" defTabSz="4703763" eaLnBrk="0" fontAlgn="base" hangingPunct="0">
+              <a:spcBef>
+                <a:spcPct val="0"/>
+              </a:spcBef>
+              <a:spcAft>
+                <a:spcPct val="0"/>
+              </a:spcAft>
+              <a:defRPr sz="9300">
+                <a:solidFill>
+                  <a:schemeClr val="tx1"/>
+                </a:solidFill>
+                <a:latin typeface="Arial"/>
+              </a:defRPr>
+            </a:lvl9pPr>
+          </a:lstStyle>
+          <a:p>
+            <a:r>
+              <a:rPr lang="en-US" sz="3600" dirty="0">
+                <a:latin typeface="Titillium Web" panose="00000500000000000000" pitchFamily="2" charset="0"/>
+                <a:ea typeface="Open Sans" panose="020B0606030504020204" pitchFamily="34" charset="0"/>
+                <a:cs typeface="Open Sans" panose="020B0606030504020204" pitchFamily="34" charset="0"/>
+                <a:hlinkClick r:id="rId18"/>
+              </a:rPr>
+              <a:t>https://openneuropet.github.io</a:t>
+            </a:r>
+            <a:endParaRPr lang="en-US" sz="3600" dirty="0">
+              <a:latin typeface="Titillium Web" panose="00000500000000000000" pitchFamily="2" charset="0"/>
+              <a:ea typeface="Open Sans" panose="020B0606030504020204" pitchFamily="34" charset="0"/>
+              <a:cs typeface="Open Sans" panose="020B0606030504020204" pitchFamily="34" charset="0"/>
+            </a:endParaRPr>
           </a:p>
         </p:txBody>
       </p:sp>

</xml_diff>

<commit_message>
Need to get the fonts working, powerpoint is, well powerpoint. Also, need to add in some more detail for the final slide/section.
</commit_message>
<xml_diff>
--- a/Generic/Posters/2021-08/generic_poster_2021-08.pptx
+++ b/Generic/Posters/2021-08/generic_poster_2021-08.pptx
@@ -5631,7 +5631,7 @@
                 <a:effectLst/>
                 <a:latin typeface="Amaranth" panose="02000503050000020004" pitchFamily="2" charset="0"/>
               </a:rPr>
-              <a:t>Results</a:t>
+              <a:t>Ongoing Efforts</a:t>
             </a:r>
           </a:p>
         </p:txBody>
@@ -6422,7 +6422,25 @@
                 </a:solidFill>
                 <a:latin typeface="Titillium Web" panose="00000500000000000000" pitchFamily="2" charset="0"/>
               </a:rPr>
-              <a:t>OpenNeuroPET is developing infrastructure and tooling that increases accessibility, reproducibility, and the curation of PET data.</a:t>
+              <a:t>OpenNeuroPET is developing infrastructure and tooling that </a:t>
+            </a:r>
+            <a:r>
+              <a:rPr lang="en-US" sz="11000">
+                <a:solidFill>
+                  <a:schemeClr val="bg1"/>
+                </a:solidFill>
+                <a:latin typeface="Titillium Web" panose="00000500000000000000" pitchFamily="2" charset="0"/>
+              </a:rPr>
+              <a:t>increases accessibility and reproducibility of </a:t>
+            </a:r>
+            <a:r>
+              <a:rPr lang="en-US" sz="11000" dirty="0">
+                <a:solidFill>
+                  <a:schemeClr val="bg1"/>
+                </a:solidFill>
+                <a:latin typeface="Titillium Web" panose="00000500000000000000" pitchFamily="2" charset="0"/>
+              </a:rPr>
+              <a:t>PET data.</a:t>
             </a:r>
           </a:p>
         </p:txBody>
@@ -6458,7 +6476,7 @@
         </p:blipFill>
         <p:spPr>
           <a:xfrm>
-            <a:off x="15443866" y="22581740"/>
+            <a:off x="36518317" y="18748529"/>
             <a:ext cx="4953000" cy="4953000"/>
           </a:xfrm>
           <a:prstGeom prst="rect">
@@ -6835,7 +6853,7 @@
         <p:spPr>
           <a:xfrm>
             <a:off x="1165334" y="11811000"/>
-            <a:ext cx="4007155" cy="3785652"/>
+            <a:ext cx="4007155" cy="4154984"/>
           </a:xfrm>
           <a:prstGeom prst="rect">
             <a:avLst/>
@@ -6850,7 +6868,15 @@
           <a:p>
             <a:r>
               <a:rPr lang="en-US" sz="2400" dirty="0"/>
-              <a:t>Once a PET dataset is converted into BIDS it can be uploaded, browsed, and downloaded via a browser (or the command line). The BIDS Validator will tell you if the dataset is valid and you can collect, view, or run analysis on this standardized structure.</a:t>
+              <a:t>Once a PET dataset is converted into BIDS it can be uploaded, browsed, and downloaded via a browser (or the command line) at </a:t>
+            </a:r>
+            <a:r>
+              <a:rPr lang="en-US" sz="2400" dirty="0" err="1"/>
+              <a:t>openneuro.org</a:t>
+            </a:r>
+            <a:r>
+              <a:rPr lang="en-US" sz="2400" dirty="0"/>
+              <a:t>. The BIDS Validator will tell you if the dataset is valid and you can collect, view, or run analysis on this standardized structure.</a:t>
             </a:r>
           </a:p>
         </p:txBody>
@@ -7020,7 +7046,7 @@
         </p:nvSpPr>
         <p:spPr>
           <a:xfrm>
-            <a:off x="26623070" y="21110956"/>
+            <a:off x="10182886" y="26735511"/>
             <a:ext cx="2411448" cy="830997"/>
           </a:xfrm>
           <a:prstGeom prst="rect">
@@ -7072,7 +7098,7 @@
         </p:blipFill>
         <p:spPr>
           <a:xfrm>
-            <a:off x="26455346" y="21919769"/>
+            <a:off x="12608887" y="26099188"/>
             <a:ext cx="2411448" cy="2411448"/>
           </a:xfrm>
           <a:prstGeom prst="rect">
@@ -7111,7 +7137,7 @@
         </p:blipFill>
         <p:spPr>
           <a:xfrm>
-            <a:off x="29454099" y="21941952"/>
+            <a:off x="17873128" y="26087353"/>
             <a:ext cx="2411447" cy="2411447"/>
           </a:xfrm>
           <a:prstGeom prst="rect">
@@ -7133,7 +7159,7 @@
         </p:nvSpPr>
         <p:spPr>
           <a:xfrm>
-            <a:off x="29636414" y="21110956"/>
+            <a:off x="15388392" y="26746200"/>
             <a:ext cx="2061408" cy="830997"/>
           </a:xfrm>
           <a:prstGeom prst="rect">
@@ -7386,7 +7412,7 @@
                 <a:effectLst/>
                 <a:latin typeface="Amaranth" panose="02000503050000020004" pitchFamily="2" charset="0"/>
               </a:rPr>
-              <a:t>Current Work</a:t>
+              <a:t>It’s a real pickle</a:t>
             </a:r>
           </a:p>
         </p:txBody>
@@ -7407,7 +7433,7 @@
         </p:nvSpPr>
         <p:spPr bwMode="auto">
           <a:xfrm>
-            <a:off x="1025566" y="21078471"/>
+            <a:off x="22632076" y="16595338"/>
             <a:ext cx="20269199" cy="2908489"/>
           </a:xfrm>
           <a:prstGeom prst="rect">
@@ -7558,7 +7584,7 @@
                 <a:ea typeface="Open Sans" panose="020B0606030504020204" pitchFamily="34" charset="0"/>
                 <a:cs typeface="Open Sans" panose="020B0606030504020204" pitchFamily="34" charset="0"/>
               </a:rPr>
-              <a:t>Specifically, OpenNeuroPET is working on developing software to support the PET BIDS standard as well as continuing to extend BIDS to support PET pre-processing derivatives.</a:t>
+              <a:t>OpenNeuroPET is working on developing software to support the PET BIDS standard, reaching out the PET community to educate and collaborate, as well as continuing to extend BIDS to support PET pre-processing derivatives.</a:t>
             </a:r>
           </a:p>
           <a:p>
@@ -7575,15 +7601,8 @@
                 <a:ea typeface="Open Sans" panose="020B0606030504020204" pitchFamily="34" charset="0"/>
                 <a:cs typeface="Open Sans" panose="020B0606030504020204" pitchFamily="34" charset="0"/>
               </a:rPr>
-              <a:t>OpenNeuroPET is building out the infrastructure to support:</a:t>
-            </a:r>
-          </a:p>
-          <a:p>
-            <a:endParaRPr lang="en-US" sz="3600" dirty="0">
-              <a:latin typeface="Titillium Web" panose="00000500000000000000" pitchFamily="2" charset="0"/>
-              <a:ea typeface="Open Sans" panose="020B0606030504020204" pitchFamily="34" charset="0"/>
-              <a:cs typeface="Open Sans" panose="020B0606030504020204" pitchFamily="34" charset="0"/>
-            </a:endParaRPr>
+              <a:t>OpenNeuro is currently involved in:</a:t>
+            </a:r>
           </a:p>
         </p:txBody>
       </p:sp>
@@ -7601,8 +7620,8 @@
         </p:nvSpPr>
         <p:spPr>
           <a:xfrm>
-            <a:off x="1115791" y="23563039"/>
-            <a:ext cx="10830418" cy="2677656"/>
+            <a:off x="22954590" y="19701208"/>
+            <a:ext cx="11829644" cy="2246769"/>
           </a:xfrm>
           <a:prstGeom prst="rect">
             <a:avLst/>
@@ -7620,7 +7639,7 @@
               <a:buChar char="-"/>
             </a:pPr>
             <a:r>
-              <a:rPr lang="en-US" sz="2400" dirty="0"/>
+              <a:rPr lang="en-US" sz="2800" dirty="0"/>
               <a:t>Conversion of reconstructed PET data and metadata into BIDS</a:t>
             </a:r>
           </a:p>
@@ -7630,7 +7649,7 @@
               <a:buChar char="-"/>
             </a:pPr>
             <a:r>
-              <a:rPr lang="en-US" sz="2400" dirty="0"/>
+              <a:rPr lang="en-US" sz="2800" dirty="0"/>
               <a:t>Creating CC0 and GDPR-DUA upload portals for OpenNeuro.org</a:t>
             </a:r>
           </a:p>
@@ -7640,38 +7659,24 @@
               <a:buChar char="-"/>
             </a:pPr>
             <a:r>
-              <a:rPr lang="en-US" sz="2400" dirty="0"/>
-              <a:t>Converting datasets at the Neurobiology Research Unit at Copenhagen University and the NIMH</a:t>
-            </a:r>
-          </a:p>
-          <a:p>
-            <a:pPr marL="342900" indent="-342900">
-              <a:buFontTx/>
-              <a:buChar char="-"/>
-            </a:pPr>
-            <a:r>
-              <a:rPr lang="en-US" sz="2400" dirty="0"/>
+              <a:rPr lang="en-US" sz="2800" dirty="0"/>
               <a:t>Reaching out to senior PET experts while extending BIDS further with BIDS extension proposal 023 to include pre-processing derivatives</a:t>
             </a:r>
           </a:p>
           <a:p>
-            <a:pPr marL="342900" indent="-342900">
-              <a:buFontTx/>
-              <a:buChar char="-"/>
-            </a:pPr>
-            <a:r>
-              <a:rPr lang="en-US" sz="2400" dirty="0"/>
-              <a:t>Working with popular neuroimaging tool makers to better support PET </a:t>
-            </a:r>
-          </a:p>
-        </p:txBody>
-      </p:sp>
-      <p:sp>
-        <p:nvSpPr>
-          <p:cNvPr id="99" name="Text Box 6">
+            <a:r>
+              <a:rPr lang="en-US" sz="2800" dirty="0"/>
+              <a:t>-   Working with popular neuroimaging tool makers to better support PET </a:t>
+            </a:r>
+          </a:p>
+        </p:txBody>
+      </p:sp>
+      <p:sp>
+        <p:nvSpPr>
+          <p:cNvPr id="100" name="Text Box 6">
             <a:extLst>
               <a:ext uri="{FF2B5EF4-FFF2-40B4-BE49-F238E27FC236}">
-                <a16:creationId xmlns:a16="http://schemas.microsoft.com/office/drawing/2014/main" id="{3305447F-6B98-0447-AC10-00044499AA7E}"/>
+                <a16:creationId xmlns:a16="http://schemas.microsoft.com/office/drawing/2014/main" id="{B28020D7-9A59-5744-B937-EFE5D4D96EF7}"/>
               </a:ext>
             </a:extLst>
           </p:cNvPr>
@@ -7682,8 +7687,8 @@
         </p:nvSpPr>
         <p:spPr bwMode="auto">
           <a:xfrm>
-            <a:off x="1025566" y="26795105"/>
-            <a:ext cx="12031220" cy="1246495"/>
+            <a:off x="36848145" y="23193698"/>
+            <a:ext cx="4293344" cy="507831"/>
           </a:xfrm>
           <a:prstGeom prst="rect">
             <a:avLst/>
@@ -7828,22 +7833,324 @@
           </a:lstStyle>
           <a:p>
             <a:r>
-              <a:rPr lang="en-US" sz="3600" dirty="0">
+              <a:rPr lang="en-US" sz="2400" dirty="0">
                 <a:latin typeface="Titillium Web" panose="00000500000000000000" pitchFamily="2" charset="0"/>
                 <a:ea typeface="Open Sans" panose="020B0606030504020204" pitchFamily="34" charset="0"/>
                 <a:cs typeface="Open Sans" panose="020B0606030504020204" pitchFamily="34" charset="0"/>
+                <a:hlinkClick r:id="rId18"/>
               </a:rPr>
-              <a:t>To contact OpenNeuroPET or to find out more about its work follow the link to the right.</a:t>
-            </a:r>
-          </a:p>
-        </p:txBody>
-      </p:sp>
-      <p:sp>
-        <p:nvSpPr>
-          <p:cNvPr id="100" name="Text Box 6">
+              <a:t>https://openneuropet.github.io</a:t>
+            </a:r>
+            <a:endParaRPr lang="en-US" sz="2400" dirty="0">
+              <a:latin typeface="Titillium Web" panose="00000500000000000000" pitchFamily="2" charset="0"/>
+              <a:ea typeface="Open Sans" panose="020B0606030504020204" pitchFamily="34" charset="0"/>
+              <a:cs typeface="Open Sans" panose="020B0606030504020204" pitchFamily="34" charset="0"/>
+            </a:endParaRPr>
+          </a:p>
+        </p:txBody>
+      </p:sp>
+      <p:sp>
+        <p:nvSpPr>
+          <p:cNvPr id="35" name="TextBox 34">
             <a:extLst>
               <a:ext uri="{FF2B5EF4-FFF2-40B4-BE49-F238E27FC236}">
-                <a16:creationId xmlns:a16="http://schemas.microsoft.com/office/drawing/2014/main" id="{B28020D7-9A59-5744-B937-EFE5D4D96EF7}"/>
+                <a16:creationId xmlns:a16="http://schemas.microsoft.com/office/drawing/2014/main" id="{B24D30BF-5E76-2549-BFB9-8BEE893C79A5}"/>
+              </a:ext>
+            </a:extLst>
+          </p:cNvPr>
+          <p:cNvSpPr txBox="1"/>
+          <p:nvPr/>
+        </p:nvSpPr>
+        <p:spPr>
+          <a:xfrm>
+            <a:off x="998357" y="24530752"/>
+            <a:ext cx="4007155" cy="1569660"/>
+          </a:xfrm>
+          <a:prstGeom prst="rect">
+            <a:avLst/>
+          </a:prstGeom>
+          <a:noFill/>
+        </p:spPr>
+        <p:txBody>
+          <a:bodyPr wrap="square" rtlCol="0">
+            <a:spAutoFit/>
+          </a:bodyPr>
+          <a:lstStyle/>
+          <a:p>
+            <a:r>
+              <a:rPr lang="en-US" sz="2400" dirty="0"/>
+              <a:t>There isn’t any PET BIDS data to study or create tools, analysis, or pipelines for.</a:t>
+            </a:r>
+          </a:p>
+        </p:txBody>
+      </p:sp>
+      <p:sp>
+        <p:nvSpPr>
+          <p:cNvPr id="37" name="TextBox 36">
+            <a:extLst>
+              <a:ext uri="{FF2B5EF4-FFF2-40B4-BE49-F238E27FC236}">
+                <a16:creationId xmlns:a16="http://schemas.microsoft.com/office/drawing/2014/main" id="{20C66A1B-4EE6-3841-894B-20E50B73E47E}"/>
+              </a:ext>
+            </a:extLst>
+          </p:cNvPr>
+          <p:cNvSpPr txBox="1"/>
+          <p:nvPr/>
+        </p:nvSpPr>
+        <p:spPr>
+          <a:xfrm>
+            <a:off x="6203645" y="24438698"/>
+            <a:ext cx="4007155" cy="1569660"/>
+          </a:xfrm>
+          <a:prstGeom prst="rect">
+            <a:avLst/>
+          </a:prstGeom>
+          <a:noFill/>
+        </p:spPr>
+        <p:txBody>
+          <a:bodyPr wrap="square" rtlCol="0">
+            <a:spAutoFit/>
+          </a:bodyPr>
+          <a:lstStyle/>
+          <a:p>
+            <a:r>
+              <a:rPr lang="en-US" sz="2400" dirty="0"/>
+              <a:t>There’s no reason to convert PET data into BIDS,</a:t>
+            </a:r>
+          </a:p>
+          <a:p>
+            <a:r>
+              <a:rPr lang="en-US" sz="2400" dirty="0"/>
+              <a:t>Or it’s too difficult to even bother.</a:t>
+            </a:r>
+          </a:p>
+        </p:txBody>
+      </p:sp>
+      <p:pic>
+        <p:nvPicPr>
+          <p:cNvPr id="5" name="Graphic 4" descr="Chicken with solid fill">
+            <a:extLst>
+              <a:ext uri="{FF2B5EF4-FFF2-40B4-BE49-F238E27FC236}">
+                <a16:creationId xmlns:a16="http://schemas.microsoft.com/office/drawing/2014/main" id="{1164EB41-D72E-4E4A-827F-1AE146A8998B}"/>
+              </a:ext>
+            </a:extLst>
+          </p:cNvPr>
+          <p:cNvPicPr>
+            <a:picLocks noChangeAspect="1"/>
+          </p:cNvPicPr>
+          <p:nvPr/>
+        </p:nvPicPr>
+        <p:blipFill>
+          <a:blip r:embed="rId19">
+            <a:extLst>
+              <a:ext uri="{28A0092B-C50C-407E-A947-70E740481C1C}">
+                <a14:useLocalDpi xmlns:a14="http://schemas.microsoft.com/office/drawing/2010/main" val="0"/>
+              </a:ext>
+              <a:ext uri="{96DAC541-7B7A-43D3-8B79-37D633B846F1}">
+                <asvg:svgBlip xmlns:asvg="http://schemas.microsoft.com/office/drawing/2016/SVG/main" r:embed="rId20"/>
+              </a:ext>
+            </a:extLst>
+          </a:blip>
+          <a:stretch>
+            <a:fillRect/>
+          </a:stretch>
+        </p:blipFill>
+        <p:spPr>
+          <a:xfrm>
+            <a:off x="1288587" y="22729552"/>
+            <a:ext cx="1825922" cy="1825922"/>
+          </a:xfrm>
+          <a:prstGeom prst="rect">
+            <a:avLst/>
+          </a:prstGeom>
+        </p:spPr>
+      </p:pic>
+      <p:pic>
+        <p:nvPicPr>
+          <p:cNvPr id="7" name="Graphic 6" descr="Egg with solid fill">
+            <a:extLst>
+              <a:ext uri="{FF2B5EF4-FFF2-40B4-BE49-F238E27FC236}">
+                <a16:creationId xmlns:a16="http://schemas.microsoft.com/office/drawing/2014/main" id="{127CBCAE-81AC-994F-8F1C-4260F688C639}"/>
+              </a:ext>
+            </a:extLst>
+          </p:cNvPr>
+          <p:cNvPicPr>
+            <a:picLocks noChangeAspect="1"/>
+          </p:cNvPicPr>
+          <p:nvPr/>
+        </p:nvPicPr>
+        <p:blipFill>
+          <a:blip r:embed="rId21">
+            <a:extLst>
+              <a:ext uri="{28A0092B-C50C-407E-A947-70E740481C1C}">
+                <a14:useLocalDpi xmlns:a14="http://schemas.microsoft.com/office/drawing/2010/main" val="0"/>
+              </a:ext>
+              <a:ext uri="{96DAC541-7B7A-43D3-8B79-37D633B846F1}">
+                <asvg:svgBlip xmlns:asvg="http://schemas.microsoft.com/office/drawing/2016/SVG/main" r:embed="rId22"/>
+              </a:ext>
+            </a:extLst>
+          </a:blip>
+          <a:stretch>
+            <a:fillRect/>
+          </a:stretch>
+        </p:blipFill>
+        <p:spPr>
+          <a:xfrm>
+            <a:off x="7340799" y="22873765"/>
+            <a:ext cx="1320899" cy="1320899"/>
+          </a:xfrm>
+          <a:prstGeom prst="rect">
+            <a:avLst/>
+          </a:prstGeom>
+        </p:spPr>
+      </p:pic>
+      <p:sp>
+        <p:nvSpPr>
+          <p:cNvPr id="15" name="Curved Up Arrow 14">
+            <a:extLst>
+              <a:ext uri="{FF2B5EF4-FFF2-40B4-BE49-F238E27FC236}">
+                <a16:creationId xmlns:a16="http://schemas.microsoft.com/office/drawing/2014/main" id="{6B10D624-99E5-364E-8D89-9B2D45B280D2}"/>
+              </a:ext>
+            </a:extLst>
+          </p:cNvPr>
+          <p:cNvSpPr/>
+          <p:nvPr/>
+        </p:nvSpPr>
+        <p:spPr bwMode="auto">
+          <a:xfrm>
+            <a:off x="1805112" y="25984200"/>
+            <a:ext cx="6400800" cy="1219200"/>
+          </a:xfrm>
+          <a:prstGeom prst="curvedUpArrow">
+            <a:avLst/>
+          </a:prstGeom>
+          <a:solidFill>
+            <a:schemeClr val="tx1"/>
+          </a:solidFill>
+          <a:ln w="9525" cap="flat" cmpd="sng" algn="ctr">
+            <a:solidFill>
+              <a:schemeClr val="tx1"/>
+            </a:solidFill>
+            <a:prstDash val="solid"/>
+            <a:round/>
+            <a:headEnd type="none" w="med" len="med"/>
+            <a:tailEnd type="none" w="med" len="med"/>
+          </a:ln>
+          <a:effectLst/>
+        </p:spPr>
+        <p:txBody>
+          <a:bodyPr vert="horz" wrap="square" lIns="91440" tIns="45720" rIns="91440" bIns="45720" numCol="1" rtlCol="0" anchor="t" anchorCtr="0" compatLnSpc="1">
+            <a:prstTxWarp prst="textNoShape">
+              <a:avLst/>
+            </a:prstTxWarp>
+          </a:bodyPr>
+          <a:lstStyle/>
+          <a:p>
+            <a:pPr marL="0" marR="0" indent="0" algn="l" defTabSz="4703763" rtl="0" eaLnBrk="1" fontAlgn="base" latinLnBrk="0" hangingPunct="1">
+              <a:lnSpc>
+                <a:spcPct val="100000"/>
+              </a:lnSpc>
+              <a:spcBef>
+                <a:spcPct val="0"/>
+              </a:spcBef>
+              <a:spcAft>
+                <a:spcPct val="0"/>
+              </a:spcAft>
+              <a:buClrTx/>
+              <a:buSzTx/>
+              <a:buFontTx/>
+              <a:buNone/>
+              <a:tabLst/>
+            </a:pPr>
+            <a:endParaRPr kumimoji="0" lang="en-US" sz="3800" b="0" i="0" u="none" strike="noStrike" cap="none" normalizeH="0" baseline="0">
+              <a:ln>
+                <a:noFill/>
+              </a:ln>
+              <a:solidFill>
+                <a:schemeClr val="tx1"/>
+              </a:solidFill>
+              <a:effectLst/>
+              <a:latin typeface="Arial" charset="0"/>
+            </a:endParaRPr>
+          </a:p>
+        </p:txBody>
+      </p:sp>
+      <p:sp>
+        <p:nvSpPr>
+          <p:cNvPr id="50" name="Curved Up Arrow 49">
+            <a:extLst>
+              <a:ext uri="{FF2B5EF4-FFF2-40B4-BE49-F238E27FC236}">
+                <a16:creationId xmlns:a16="http://schemas.microsoft.com/office/drawing/2014/main" id="{720D7917-BF84-044C-8DD5-546BB56DEBAA}"/>
+              </a:ext>
+            </a:extLst>
+          </p:cNvPr>
+          <p:cNvSpPr/>
+          <p:nvPr/>
+        </p:nvSpPr>
+        <p:spPr bwMode="auto">
+          <a:xfrm flipH="1" flipV="1">
+            <a:off x="1816425" y="21510352"/>
+            <a:ext cx="6400800" cy="1219200"/>
+          </a:xfrm>
+          <a:prstGeom prst="curvedUpArrow">
+            <a:avLst/>
+          </a:prstGeom>
+          <a:solidFill>
+            <a:schemeClr val="tx1"/>
+          </a:solidFill>
+          <a:ln w="9525" cap="flat" cmpd="sng" algn="ctr">
+            <a:solidFill>
+              <a:schemeClr val="tx1"/>
+            </a:solidFill>
+            <a:prstDash val="solid"/>
+            <a:round/>
+            <a:headEnd type="none" w="med" len="med"/>
+            <a:tailEnd type="none" w="med" len="med"/>
+          </a:ln>
+          <a:effectLst/>
+        </p:spPr>
+        <p:txBody>
+          <a:bodyPr vert="horz" wrap="square" lIns="91440" tIns="45720" rIns="91440" bIns="45720" numCol="1" rtlCol="0" anchor="t" anchorCtr="0" compatLnSpc="1">
+            <a:prstTxWarp prst="textNoShape">
+              <a:avLst/>
+            </a:prstTxWarp>
+          </a:bodyPr>
+          <a:lstStyle/>
+          <a:p>
+            <a:pPr marL="0" marR="0" indent="0" algn="l" defTabSz="4703763" rtl="0" eaLnBrk="1" fontAlgn="base" latinLnBrk="0" hangingPunct="1">
+              <a:lnSpc>
+                <a:spcPct val="100000"/>
+              </a:lnSpc>
+              <a:spcBef>
+                <a:spcPct val="0"/>
+              </a:spcBef>
+              <a:spcAft>
+                <a:spcPct val="0"/>
+              </a:spcAft>
+              <a:buClrTx/>
+              <a:buSzTx/>
+              <a:buFontTx/>
+              <a:buNone/>
+              <a:tabLst/>
+            </a:pPr>
+            <a:endParaRPr kumimoji="0" lang="en-US" sz="3800" b="0" i="0" u="none" strike="noStrike" cap="none" normalizeH="0" baseline="0">
+              <a:ln>
+                <a:noFill/>
+              </a:ln>
+              <a:solidFill>
+                <a:schemeClr val="tx1"/>
+              </a:solidFill>
+              <a:effectLst/>
+              <a:latin typeface="Arial" charset="0"/>
+            </a:endParaRPr>
+          </a:p>
+        </p:txBody>
+      </p:sp>
+      <p:sp>
+        <p:nvSpPr>
+          <p:cNvPr id="53" name="Text Box 6">
+            <a:extLst>
+              <a:ext uri="{FF2B5EF4-FFF2-40B4-BE49-F238E27FC236}">
+                <a16:creationId xmlns:a16="http://schemas.microsoft.com/office/drawing/2014/main" id="{6F22633A-4E2B-0244-9478-5DF70D5621D4}"/>
               </a:ext>
             </a:extLst>
           </p:cNvPr>
@@ -7854,8 +8161,8 @@
         </p:nvSpPr>
         <p:spPr bwMode="auto">
           <a:xfrm>
-            <a:off x="14619393" y="27332942"/>
-            <a:ext cx="6542560" cy="692497"/>
+            <a:off x="10180888" y="21202042"/>
+            <a:ext cx="10981065" cy="4447371"/>
           </a:xfrm>
           <a:prstGeom prst="rect">
             <a:avLst/>
@@ -8000,22 +8307,260 @@
           </a:lstStyle>
           <a:p>
             <a:r>
-              <a:rPr lang="en-US" sz="3600" dirty="0">
+              <a:rPr lang="en-US" sz="2800" dirty="0">
                 <a:latin typeface="Titillium Web" panose="00000500000000000000" pitchFamily="2" charset="0"/>
                 <a:ea typeface="Open Sans" panose="020B0606030504020204" pitchFamily="34" charset="0"/>
                 <a:cs typeface="Open Sans" panose="020B0606030504020204" pitchFamily="34" charset="0"/>
-                <a:hlinkClick r:id="rId18"/>
               </a:rPr>
-              <a:t>https://openneuropet.github.io</a:t>
-            </a:r>
-            <a:endParaRPr lang="en-US" sz="3600" dirty="0">
-              <a:latin typeface="Titillium Web" panose="00000500000000000000" pitchFamily="2" charset="0"/>
-              <a:ea typeface="Open Sans" panose="020B0606030504020204" pitchFamily="34" charset="0"/>
-              <a:cs typeface="Open Sans" panose="020B0606030504020204" pitchFamily="34" charset="0"/>
-            </a:endParaRPr>
-          </a:p>
-        </p:txBody>
-      </p:sp>
+              <a:t>Before PET was integrated into BIDS with BEP009 this chicken and egg problem was nearly intractable. OpenNeuroPET’s current focus is attacking each side of this issue. By converting PET datasets to host on OpenNeuro.org from the Neurobiology Research Unit at Copenhagen University and the NIMH OpenNeuro can test and develop conversion software while populating a sparse BIDS PET landscape. OpenNeuroPET has created converter software for ECAT image types and continues to extend coverage into other imaging formats such as Dicom, Analyze and MicroPET. To see the current converters or use the BIDS Validator on your own PET data  follow the QR codes below. </a:t>
+            </a:r>
+          </a:p>
+        </p:txBody>
+      </p:sp>
+      <p:sp>
+        <p:nvSpPr>
+          <p:cNvPr id="55" name="Text Box 6">
+            <a:extLst>
+              <a:ext uri="{FF2B5EF4-FFF2-40B4-BE49-F238E27FC236}">
+                <a16:creationId xmlns:a16="http://schemas.microsoft.com/office/drawing/2014/main" id="{F1E905F5-715C-A84D-8795-6CEBB58A03D3}"/>
+              </a:ext>
+            </a:extLst>
+          </p:cNvPr>
+          <p:cNvSpPr txBox="1">
+            <a:spLocks noChangeArrowheads="1"/>
+          </p:cNvSpPr>
+          <p:nvPr/>
+        </p:nvSpPr>
+        <p:spPr bwMode="auto">
+          <a:xfrm>
+            <a:off x="23034119" y="25256338"/>
+            <a:ext cx="11054173" cy="2908489"/>
+          </a:xfrm>
+          <a:prstGeom prst="rect">
+            <a:avLst/>
+          </a:prstGeom>
+          <a:noFill/>
+          <a:ln>
+            <a:noFill/>
+          </a:ln>
+          <a:extLst>
+            <a:ext uri="{909E8E84-426E-40DD-AFC4-6F175D3DCCD1}">
+              <a14:hiddenFill xmlns:a14="http://schemas.microsoft.com/office/drawing/2010/main">
+                <a:solidFill>
+                  <a:schemeClr val="accent1"/>
+                </a:solidFill>
+              </a14:hiddenFill>
+            </a:ext>
+            <a:ext uri="{91240B29-F687-4F45-9708-019B960494DF}">
+              <a14:hiddenLine xmlns:a14="http://schemas.microsoft.com/office/drawing/2010/main" w="9525">
+                <a:solidFill>
+                  <a:schemeClr val="tx1"/>
+                </a:solidFill>
+                <a:miter lim="800000"/>
+                <a:headEnd/>
+                <a:tailEnd/>
+              </a14:hiddenLine>
+            </a:ext>
+            <a:ext uri="{AF507438-7753-43E0-B8FC-AC1667EBCBE1}">
+              <a14:hiddenEffects xmlns:a14="http://schemas.microsoft.com/office/drawing/2010/main">
+                <a:effectLst>
+                  <a:outerShdw dist="35921" dir="2700000" algn="ctr" rotWithShape="0">
+                    <a:schemeClr val="bg2"/>
+                  </a:outerShdw>
+                </a:effectLst>
+              </a14:hiddenEffects>
+            </a:ext>
+          </a:extLst>
+        </p:spPr>
+        <p:txBody>
+          <a:bodyPr wrap="square" lIns="137160" tIns="68580" rIns="137160" bIns="68580">
+            <a:spAutoFit/>
+          </a:bodyPr>
+          <a:lstStyle>
+            <a:defPPr>
+              <a:defRPr kern="1200" smtId="4294967295"/>
+            </a:defPPr>
+            <a:lvl1pPr defTabSz="4703763" eaLnBrk="0" hangingPunct="0">
+              <a:defRPr sz="9300">
+                <a:solidFill>
+                  <a:schemeClr val="tx1"/>
+                </a:solidFill>
+                <a:latin typeface="Arial"/>
+              </a:defRPr>
+            </a:lvl1pPr>
+            <a:lvl2pPr marL="742950" indent="-285750" defTabSz="4703763" eaLnBrk="0" hangingPunct="0">
+              <a:defRPr sz="9300">
+                <a:solidFill>
+                  <a:schemeClr val="tx1"/>
+                </a:solidFill>
+                <a:latin typeface="Arial"/>
+              </a:defRPr>
+            </a:lvl2pPr>
+            <a:lvl3pPr marL="1143000" indent="-228600" defTabSz="4703763" eaLnBrk="0" hangingPunct="0">
+              <a:defRPr sz="9300">
+                <a:solidFill>
+                  <a:schemeClr val="tx1"/>
+                </a:solidFill>
+                <a:latin typeface="Arial"/>
+              </a:defRPr>
+            </a:lvl3pPr>
+            <a:lvl4pPr marL="1600200" indent="-228600" defTabSz="4703763" eaLnBrk="0" hangingPunct="0">
+              <a:defRPr sz="9300">
+                <a:solidFill>
+                  <a:schemeClr val="tx1"/>
+                </a:solidFill>
+                <a:latin typeface="Arial"/>
+              </a:defRPr>
+            </a:lvl4pPr>
+            <a:lvl5pPr marL="2057400" indent="-228600" defTabSz="4703763" eaLnBrk="0" hangingPunct="0">
+              <a:defRPr sz="9300">
+                <a:solidFill>
+                  <a:schemeClr val="tx1"/>
+                </a:solidFill>
+                <a:latin typeface="Arial"/>
+              </a:defRPr>
+            </a:lvl5pPr>
+            <a:lvl6pPr marL="2514600" indent="-228600" defTabSz="4703763" eaLnBrk="0" fontAlgn="base" hangingPunct="0">
+              <a:spcBef>
+                <a:spcPct val="0"/>
+              </a:spcBef>
+              <a:spcAft>
+                <a:spcPct val="0"/>
+              </a:spcAft>
+              <a:defRPr sz="9300">
+                <a:solidFill>
+                  <a:schemeClr val="tx1"/>
+                </a:solidFill>
+                <a:latin typeface="Arial"/>
+              </a:defRPr>
+            </a:lvl6pPr>
+            <a:lvl7pPr marL="2971800" indent="-228600" defTabSz="4703763" eaLnBrk="0" fontAlgn="base" hangingPunct="0">
+              <a:spcBef>
+                <a:spcPct val="0"/>
+              </a:spcBef>
+              <a:spcAft>
+                <a:spcPct val="0"/>
+              </a:spcAft>
+              <a:defRPr sz="9300">
+                <a:solidFill>
+                  <a:schemeClr val="tx1"/>
+                </a:solidFill>
+                <a:latin typeface="Arial"/>
+              </a:defRPr>
+            </a:lvl7pPr>
+            <a:lvl8pPr marL="3429000" indent="-228600" defTabSz="4703763" eaLnBrk="0" fontAlgn="base" hangingPunct="0">
+              <a:spcBef>
+                <a:spcPct val="0"/>
+              </a:spcBef>
+              <a:spcAft>
+                <a:spcPct val="0"/>
+              </a:spcAft>
+              <a:defRPr sz="9300">
+                <a:solidFill>
+                  <a:schemeClr val="tx1"/>
+                </a:solidFill>
+                <a:latin typeface="Arial"/>
+              </a:defRPr>
+            </a:lvl8pPr>
+            <a:lvl9pPr marL="3886200" indent="-228600" defTabSz="4703763" eaLnBrk="0" fontAlgn="base" hangingPunct="0">
+              <a:spcBef>
+                <a:spcPct val="0"/>
+              </a:spcBef>
+              <a:spcAft>
+                <a:spcPct val="0"/>
+              </a:spcAft>
+              <a:defRPr sz="9300">
+                <a:solidFill>
+                  <a:schemeClr val="tx1"/>
+                </a:solidFill>
+                <a:latin typeface="Arial"/>
+              </a:defRPr>
+            </a:lvl9pPr>
+          </a:lstStyle>
+          <a:p>
+            <a:r>
+              <a:rPr lang="en-US" sz="3600" dirty="0">
+                <a:latin typeface="Arial" panose="020B0604020202020204" pitchFamily="34" charset="0"/>
+                <a:ea typeface="+mj-ea"/>
+                <a:cs typeface="Arial" panose="020B0604020202020204" pitchFamily="34" charset="0"/>
+              </a:rPr>
+              <a:t>OpenNeuroPET is a collaboration between Stanford university, NIH, MGH and the Neurobiology Research Unit (NRU) at Copenhagen University Hospital. It is funded through the BRAIN initiative and the Novo Nordisk foundation. </a:t>
+            </a:r>
+          </a:p>
+        </p:txBody>
+      </p:sp>
+      <p:pic>
+        <p:nvPicPr>
+          <p:cNvPr id="18" name="Picture 17" descr="Logo, company name&#10;&#10;Description automatically generated">
+            <a:extLst>
+              <a:ext uri="{FF2B5EF4-FFF2-40B4-BE49-F238E27FC236}">
+                <a16:creationId xmlns:a16="http://schemas.microsoft.com/office/drawing/2014/main" id="{B59E71D3-890A-844C-BC34-9F980437BBFA}"/>
+              </a:ext>
+            </a:extLst>
+          </p:cNvPr>
+          <p:cNvPicPr>
+            <a:picLocks noChangeAspect="1"/>
+          </p:cNvPicPr>
+          <p:nvPr/>
+        </p:nvPicPr>
+        <p:blipFill>
+          <a:blip r:embed="rId23">
+            <a:extLst>
+              <a:ext uri="{28A0092B-C50C-407E-A947-70E740481C1C}">
+                <a14:useLocalDpi xmlns:a14="http://schemas.microsoft.com/office/drawing/2010/main" val="0"/>
+              </a:ext>
+            </a:extLst>
+          </a:blip>
+          <a:stretch>
+            <a:fillRect/>
+          </a:stretch>
+        </p:blipFill>
+        <p:spPr>
+          <a:xfrm>
+            <a:off x="39621445" y="25603460"/>
+            <a:ext cx="2748312" cy="1980680"/>
+          </a:xfrm>
+          <a:prstGeom prst="rect">
+            <a:avLst/>
+          </a:prstGeom>
+        </p:spPr>
+      </p:pic>
+      <p:pic>
+        <p:nvPicPr>
+          <p:cNvPr id="22" name="Picture 21" descr="Logo&#10;&#10;Description automatically generated">
+            <a:extLst>
+              <a:ext uri="{FF2B5EF4-FFF2-40B4-BE49-F238E27FC236}">
+                <a16:creationId xmlns:a16="http://schemas.microsoft.com/office/drawing/2014/main" id="{8C688EFF-F875-D347-9791-0DAB1CB96F05}"/>
+              </a:ext>
+            </a:extLst>
+          </p:cNvPr>
+          <p:cNvPicPr>
+            <a:picLocks noChangeAspect="1"/>
+          </p:cNvPicPr>
+          <p:nvPr/>
+        </p:nvPicPr>
+        <p:blipFill>
+          <a:blip r:embed="rId24">
+            <a:extLst>
+              <a:ext uri="{28A0092B-C50C-407E-A947-70E740481C1C}">
+                <a14:useLocalDpi xmlns:a14="http://schemas.microsoft.com/office/drawing/2010/main" val="0"/>
+              </a:ext>
+            </a:extLst>
+          </a:blip>
+          <a:stretch>
+            <a:fillRect/>
+          </a:stretch>
+        </p:blipFill>
+        <p:spPr>
+          <a:xfrm>
+            <a:off x="35397966" y="25649413"/>
+            <a:ext cx="2374900" cy="2082800"/>
+          </a:xfrm>
+          <a:prstGeom prst="rect">
+            <a:avLst/>
+          </a:prstGeom>
+        </p:spPr>
+      </p:pic>
     </p:spTree>
   </p:cSld>
   <p:clrMapOvr>

</xml_diff>